<commit_message>
Introducting consistency to SS Interaction Manager to detailed diagrams
</commit_message>
<xml_diff>
--- a/HeyBlue.pptx
+++ b/HeyBlue.pptx
@@ -1631,58 +1631,176 @@
           <a:chExt cx="0" cy="0"/>
         </a:xfrm>
       </p:grpSpPr>
-      <p:sp>
-        <p:nvSpPr>
-          <p:cNvPr id="4" name="Title 3">
+      <p:pic>
+        <p:nvPicPr>
+          <p:cNvPr id="23" name="Picture 22">
             <a:extLst>
               <a:ext uri="{FF2B5EF4-FFF2-40B4-BE49-F238E27FC236}">
-                <a16:creationId xmlns:a16="http://schemas.microsoft.com/office/drawing/2014/main" id="{C057AAF4-AA79-7E35-D655-CFFDEBBF29C2}"/>
+                <a16:creationId xmlns:a16="http://schemas.microsoft.com/office/drawing/2014/main" id="{92028D26-17F0-A582-B7A7-B7A037FD6DD6}"/>
               </a:ext>
             </a:extLst>
           </p:cNvPr>
-          <p:cNvSpPr>
-            <a:spLocks noGrp="1"/>
-          </p:cNvSpPr>
-          <p:nvPr>
-            <p:ph type="title"/>
-          </p:nvPr>
-        </p:nvSpPr>
-        <p:spPr/>
-        <p:txBody>
-          <a:bodyPr>
-            <a:normAutofit fontScale="90000"/>
-          </a:bodyPr>
-          <a:lstStyle/>
-          <a:p>
-            <a:endParaRPr lang="en-GB"/>
-          </a:p>
-        </p:txBody>
-      </p:sp>
-      <p:sp>
-        <p:nvSpPr>
-          <p:cNvPr id="5" name="Content Placeholder 4">
+          <p:cNvPicPr>
+            <a:picLocks noChangeAspect="1"/>
+          </p:cNvPicPr>
+          <p:nvPr/>
+        </p:nvPicPr>
+        <p:blipFill>
+          <a:blip r:embed="rId2"/>
+          <a:stretch>
+            <a:fillRect/>
+          </a:stretch>
+        </p:blipFill>
+        <p:spPr>
+          <a:xfrm>
+            <a:off x="1571626" y="1225550"/>
+            <a:ext cx="3073162" cy="2413001"/>
+          </a:xfrm>
+          <a:prstGeom prst="rect">
+            <a:avLst/>
+          </a:prstGeom>
+          <a:scene3d>
+            <a:camera prst="isometricTopUp"/>
+            <a:lightRig rig="threePt" dir="t"/>
+          </a:scene3d>
+        </p:spPr>
+      </p:pic>
+      <p:sp>
+        <p:nvSpPr>
+          <p:cNvPr id="24" name="Arrow: Up-Down 23">
             <a:extLst>
               <a:ext uri="{FF2B5EF4-FFF2-40B4-BE49-F238E27FC236}">
-                <a16:creationId xmlns:a16="http://schemas.microsoft.com/office/drawing/2014/main" id="{BE254B03-961B-3942-F6C2-DD9AA162C955}"/>
+                <a16:creationId xmlns:a16="http://schemas.microsoft.com/office/drawing/2014/main" id="{00EDA289-3C72-38D0-D29B-49CEF608D277}"/>
               </a:ext>
             </a:extLst>
           </p:cNvPr>
-          <p:cNvSpPr>
-            <a:spLocks noGrp="1"/>
-          </p:cNvSpPr>
-          <p:nvPr>
-            <p:ph idx="1"/>
-          </p:nvPr>
-        </p:nvSpPr>
-        <p:spPr/>
-        <p:txBody>
-          <a:bodyPr/>
+          <p:cNvSpPr/>
+          <p:nvPr/>
+        </p:nvSpPr>
+        <p:spPr>
+          <a:xfrm>
+            <a:off x="114301" y="957262"/>
+            <a:ext cx="1009650" cy="4943475"/>
+          </a:xfrm>
+          <a:prstGeom prst="upDownArrow">
+            <a:avLst/>
+          </a:prstGeom>
+          <a:gradFill flip="none" rotWithShape="1">
+            <a:gsLst>
+              <a:gs pos="0">
+                <a:srgbClr val="D32827"/>
+              </a:gs>
+              <a:gs pos="50600">
+                <a:srgbClr val="E3561E"/>
+              </a:gs>
+              <a:gs pos="100000">
+                <a:srgbClr val="ED7D14"/>
+              </a:gs>
+            </a:gsLst>
+            <a:lin ang="5400000" scaled="1"/>
+            <a:tileRect/>
+          </a:gradFill>
+          <a:ln>
+            <a:noFill/>
+          </a:ln>
+        </p:spPr>
+        <p:style>
+          <a:lnRef idx="2">
+            <a:schemeClr val="accent1">
+              <a:shade val="50000"/>
+            </a:schemeClr>
+          </a:lnRef>
+          <a:fillRef idx="1">
+            <a:schemeClr val="accent1"/>
+          </a:fillRef>
+          <a:effectRef idx="0">
+            <a:schemeClr val="accent1"/>
+          </a:effectRef>
+          <a:fontRef idx="minor">
+            <a:schemeClr val="lt1"/>
+          </a:fontRef>
+        </p:style>
+        <p:txBody>
+          <a:bodyPr rtlCol="0" anchor="ctr"/>
           <a:lstStyle/>
           <a:p>
+            <a:pPr algn="ctr"/>
             <a:endParaRPr lang="en-GB"/>
           </a:p>
         </p:txBody>
       </p:sp>
+      <p:pic>
+        <p:nvPicPr>
+          <p:cNvPr id="26" name="Graphic 25">
+            <a:extLst>
+              <a:ext uri="{FF2B5EF4-FFF2-40B4-BE49-F238E27FC236}">
+                <a16:creationId xmlns:a16="http://schemas.microsoft.com/office/drawing/2014/main" id="{539DB09C-FABC-33DE-F463-D4022E46612A}"/>
+              </a:ext>
+            </a:extLst>
+          </p:cNvPr>
+          <p:cNvPicPr>
+            <a:picLocks noChangeAspect="1"/>
+          </p:cNvPicPr>
+          <p:nvPr/>
+        </p:nvPicPr>
+        <p:blipFill>
+          <a:blip r:embed="rId3">
+            <a:extLst>
+              <a:ext uri="{96DAC541-7B7A-43D3-8B79-37D633B846F1}">
+                <asvg:svgBlip xmlns:asvg="http://schemas.microsoft.com/office/drawing/2016/SVG/main" r:embed="rId4"/>
+              </a:ext>
+            </a:extLst>
+          </a:blip>
+          <a:stretch>
+            <a:fillRect/>
+          </a:stretch>
+        </p:blipFill>
+        <p:spPr>
+          <a:xfrm>
+            <a:off x="5791199" y="2366963"/>
+            <a:ext cx="1271588" cy="1271588"/>
+          </a:xfrm>
+          <a:prstGeom prst="rect">
+            <a:avLst/>
+          </a:prstGeom>
+        </p:spPr>
+      </p:pic>
+      <p:pic>
+        <p:nvPicPr>
+          <p:cNvPr id="28" name="Graphic 27">
+            <a:extLst>
+              <a:ext uri="{FF2B5EF4-FFF2-40B4-BE49-F238E27FC236}">
+                <a16:creationId xmlns:a16="http://schemas.microsoft.com/office/drawing/2014/main" id="{4A7AE1D4-209B-62CF-335A-E63E82A4C7C0}"/>
+              </a:ext>
+            </a:extLst>
+          </p:cNvPr>
+          <p:cNvPicPr>
+            <a:picLocks noChangeAspect="1"/>
+          </p:cNvPicPr>
+          <p:nvPr/>
+        </p:nvPicPr>
+        <p:blipFill>
+          <a:blip r:embed="rId5">
+            <a:extLst>
+              <a:ext uri="{96DAC541-7B7A-43D3-8B79-37D633B846F1}">
+                <asvg:svgBlip xmlns:asvg="http://schemas.microsoft.com/office/drawing/2016/SVG/main" r:embed="rId6"/>
+              </a:ext>
+            </a:extLst>
+          </a:blip>
+          <a:stretch>
+            <a:fillRect/>
+          </a:stretch>
+        </p:blipFill>
+        <p:spPr>
+          <a:xfrm>
+            <a:off x="6155531" y="4148137"/>
+            <a:ext cx="542925" cy="542925"/>
+          </a:xfrm>
+          <a:prstGeom prst="rect">
+            <a:avLst/>
+          </a:prstGeom>
+        </p:spPr>
+      </p:pic>
     </p:spTree>
     <p:extLst>
       <p:ext uri="{BB962C8B-B14F-4D97-AF65-F5344CB8AC3E}">

</xml_diff>

<commit_message>
Container diagram work, connections and flow
</commit_message>
<xml_diff>
--- a/HeyBlue.pptx
+++ b/HeyBlue.pptx
@@ -7,6 +7,8 @@
   <p:sldIdLst>
     <p:sldId id="256" r:id="rId2"/>
     <p:sldId id="257" r:id="rId3"/>
+    <p:sldId id="258" r:id="rId4"/>
+    <p:sldId id="259" r:id="rId5"/>
   </p:sldIdLst>
   <p:sldSz cx="9144000" cy="6858000" type="screen4x3"/>
   <p:notesSz cx="6858000" cy="9144000"/>
@@ -1633,10 +1635,10 @@
       </p:grpSpPr>
       <p:pic>
         <p:nvPicPr>
-          <p:cNvPr id="23" name="Picture 22">
-            <a:extLst>
-              <a:ext uri="{FF2B5EF4-FFF2-40B4-BE49-F238E27FC236}">
-                <a16:creationId xmlns:a16="http://schemas.microsoft.com/office/drawing/2014/main" id="{92028D26-17F0-A582-B7A7-B7A037FD6DD6}"/>
+          <p:cNvPr id="129" name="Picture 128">
+            <a:extLst>
+              <a:ext uri="{FF2B5EF4-FFF2-40B4-BE49-F238E27FC236}">
+                <a16:creationId xmlns:a16="http://schemas.microsoft.com/office/drawing/2014/main" id="{26BE5742-97A0-6947-8954-82DE3005E757}"/>
               </a:ext>
             </a:extLst>
           </p:cNvPr>
@@ -1646,25 +1648,114 @@
           <p:nvPr/>
         </p:nvPicPr>
         <p:blipFill>
-          <a:blip r:embed="rId2"/>
+          <a:blip r:embed="rId3">
+            <a:extLst>
+              <a:ext uri="{28A0092B-C50C-407E-A947-70E740481C1C}">
+                <a14:useLocalDpi xmlns:a14="http://schemas.microsoft.com/office/drawing/2010/main" val="0"/>
+              </a:ext>
+            </a:extLst>
+          </a:blip>
           <a:stretch>
             <a:fillRect/>
           </a:stretch>
         </p:blipFill>
         <p:spPr>
           <a:xfrm>
-            <a:off x="1571626" y="1225550"/>
-            <a:ext cx="3073162" cy="2413001"/>
-          </a:xfrm>
-          <a:prstGeom prst="rect">
-            <a:avLst/>
-          </a:prstGeom>
+            <a:off x="1857374" y="3552186"/>
+            <a:ext cx="2714625" cy="2022727"/>
+          </a:xfrm>
+          <a:prstGeom prst="rect">
+            <a:avLst/>
+          </a:prstGeom>
+          <a:ln>
+            <a:solidFill>
+              <a:srgbClr val="999999"/>
+            </a:solidFill>
+          </a:ln>
           <a:scene3d>
             <a:camera prst="isometricTopUp"/>
             <a:lightRig rig="threePt" dir="t"/>
           </a:scene3d>
         </p:spPr>
       </p:pic>
+      <p:pic>
+        <p:nvPicPr>
+          <p:cNvPr id="127" name="Picture 126">
+            <a:extLst>
+              <a:ext uri="{FF2B5EF4-FFF2-40B4-BE49-F238E27FC236}">
+                <a16:creationId xmlns:a16="http://schemas.microsoft.com/office/drawing/2014/main" id="{9AD95724-96CF-DBFC-F284-B3EB526289A5}"/>
+              </a:ext>
+            </a:extLst>
+          </p:cNvPr>
+          <p:cNvPicPr>
+            <a:picLocks noChangeAspect="1"/>
+          </p:cNvPicPr>
+          <p:nvPr/>
+        </p:nvPicPr>
+        <p:blipFill>
+          <a:blip r:embed="rId4"/>
+          <a:stretch>
+            <a:fillRect/>
+          </a:stretch>
+        </p:blipFill>
+        <p:spPr>
+          <a:xfrm>
+            <a:off x="2899646" y="2325252"/>
+            <a:ext cx="2934418" cy="2318412"/>
+          </a:xfrm>
+          <a:prstGeom prst="rect">
+            <a:avLst/>
+          </a:prstGeom>
+          <a:ln>
+            <a:solidFill>
+              <a:srgbClr val="999999"/>
+            </a:solidFill>
+          </a:ln>
+          <a:scene3d>
+            <a:camera prst="isometricTopUp"/>
+            <a:lightRig rig="threePt" dir="t"/>
+          </a:scene3d>
+        </p:spPr>
+      </p:pic>
+      <p:pic>
+        <p:nvPicPr>
+          <p:cNvPr id="23" name="Picture 22">
+            <a:extLst>
+              <a:ext uri="{FF2B5EF4-FFF2-40B4-BE49-F238E27FC236}">
+                <a16:creationId xmlns:a16="http://schemas.microsoft.com/office/drawing/2014/main" id="{92028D26-17F0-A582-B7A7-B7A037FD6DD6}"/>
+              </a:ext>
+            </a:extLst>
+          </p:cNvPr>
+          <p:cNvPicPr>
+            <a:picLocks noChangeAspect="1"/>
+          </p:cNvPicPr>
+          <p:nvPr/>
+        </p:nvPicPr>
+        <p:blipFill>
+          <a:blip r:embed="rId5"/>
+          <a:stretch>
+            <a:fillRect/>
+          </a:stretch>
+        </p:blipFill>
+        <p:spPr>
+          <a:xfrm>
+            <a:off x="2786682" y="1593414"/>
+            <a:ext cx="3073162" cy="2413001"/>
+          </a:xfrm>
+          <a:prstGeom prst="rect">
+            <a:avLst/>
+          </a:prstGeom>
+          <a:solidFill>
+            <a:srgbClr val="D9D9D9">
+              <a:alpha val="41000"/>
+            </a:srgbClr>
+          </a:solidFill>
+          <a:scene3d>
+            <a:camera prst="isometricTopUp"/>
+            <a:lightRig rig="threePt" dir="t"/>
+          </a:scene3d>
+        </p:spPr>
+      </p:pic>
       <p:sp>
         <p:nvSpPr>
           <p:cNvPr id="24" name="Arrow: Up-Down 23">
@@ -1679,8 +1770,8 @@
         </p:nvSpPr>
         <p:spPr>
           <a:xfrm>
-            <a:off x="114301" y="957262"/>
-            <a:ext cx="1009650" cy="4943475"/>
+            <a:off x="7797905" y="1225929"/>
+            <a:ext cx="559251" cy="4271962"/>
           </a:xfrm>
           <a:prstGeom prst="upDownArrow">
             <a:avLst/>
@@ -1744,10 +1835,10 @@
           <p:nvPr/>
         </p:nvPicPr>
         <p:blipFill>
-          <a:blip r:embed="rId3">
+          <a:blip r:embed="rId6">
             <a:extLst>
               <a:ext uri="{96DAC541-7B7A-43D3-8B79-37D633B846F1}">
-                <asvg:svgBlip xmlns:asvg="http://schemas.microsoft.com/office/drawing/2016/SVG/main" r:embed="rId4"/>
+                <asvg:svgBlip xmlns:asvg="http://schemas.microsoft.com/office/drawing/2016/SVG/main" r:embed="rId7"/>
               </a:ext>
             </a:extLst>
           </a:blip>
@@ -1757,8 +1848,8 @@
         </p:blipFill>
         <p:spPr>
           <a:xfrm>
-            <a:off x="5791199" y="2366963"/>
-            <a:ext cx="1271588" cy="1271588"/>
+            <a:off x="293190" y="3883232"/>
+            <a:ext cx="1041193" cy="1041193"/>
           </a:xfrm>
           <a:prstGeom prst="rect">
             <a:avLst/>
@@ -1780,10 +1871,10 @@
           <p:nvPr/>
         </p:nvPicPr>
         <p:blipFill>
-          <a:blip r:embed="rId5">
+          <a:blip r:embed="rId8">
             <a:extLst>
               <a:ext uri="{96DAC541-7B7A-43D3-8B79-37D633B846F1}">
-                <asvg:svgBlip xmlns:asvg="http://schemas.microsoft.com/office/drawing/2016/SVG/main" r:embed="rId6"/>
+                <asvg:svgBlip xmlns:asvg="http://schemas.microsoft.com/office/drawing/2016/SVG/main" r:embed="rId9"/>
               </a:ext>
             </a:extLst>
           </a:blip>
@@ -1793,18 +1884,3260 @@
         </p:blipFill>
         <p:spPr>
           <a:xfrm>
-            <a:off x="6155531" y="4148137"/>
-            <a:ext cx="542925" cy="542925"/>
+            <a:off x="1021854" y="3008208"/>
+            <a:ext cx="411268" cy="411268"/>
           </a:xfrm>
           <a:prstGeom prst="rect">
             <a:avLst/>
           </a:prstGeom>
         </p:spPr>
       </p:pic>
+      <p:pic>
+        <p:nvPicPr>
+          <p:cNvPr id="3" name="Picture 2">
+            <a:extLst>
+              <a:ext uri="{FF2B5EF4-FFF2-40B4-BE49-F238E27FC236}">
+                <a16:creationId xmlns:a16="http://schemas.microsoft.com/office/drawing/2014/main" id="{E6321AB5-9C5C-3C85-B08F-E6BFCF8197CB}"/>
+              </a:ext>
+            </a:extLst>
+          </p:cNvPr>
+          <p:cNvPicPr>
+            <a:picLocks noChangeAspect="1"/>
+          </p:cNvPicPr>
+          <p:nvPr/>
+        </p:nvPicPr>
+        <p:blipFill>
+          <a:blip r:embed="rId10">
+            <a:extLst>
+              <a:ext uri="{BEBA8EAE-BF5A-486C-A8C5-ECC9F3942E4B}">
+                <a14:imgProps xmlns:a14="http://schemas.microsoft.com/office/drawing/2010/main">
+                  <a14:imgLayer r:embed="rId11">
+                    <a14:imgEffect>
+                      <a14:saturation sat="33000"/>
+                    </a14:imgEffect>
+                  </a14:imgLayer>
+                </a14:imgProps>
+              </a:ext>
+              <a:ext uri="{28A0092B-C50C-407E-A947-70E740481C1C}">
+                <a14:useLocalDpi xmlns:a14="http://schemas.microsoft.com/office/drawing/2010/main" val="0"/>
+              </a:ext>
+            </a:extLst>
+          </a:blip>
+          <a:stretch>
+            <a:fillRect/>
+          </a:stretch>
+        </p:blipFill>
+        <p:spPr>
+          <a:xfrm>
+            <a:off x="2899727" y="1198941"/>
+            <a:ext cx="2847073" cy="2556279"/>
+          </a:xfrm>
+          <a:prstGeom prst="rect">
+            <a:avLst/>
+          </a:prstGeom>
+          <a:solidFill>
+            <a:schemeClr val="bg1">
+              <a:alpha val="46000"/>
+            </a:schemeClr>
+          </a:solidFill>
+          <a:ln w="12700">
+            <a:solidFill>
+              <a:srgbClr val="999999"/>
+            </a:solidFill>
+          </a:ln>
+          <a:scene3d>
+            <a:camera prst="isometricTopUp"/>
+            <a:lightRig rig="threePt" dir="t"/>
+          </a:scene3d>
+        </p:spPr>
+      </p:pic>
+      <p:pic>
+        <p:nvPicPr>
+          <p:cNvPr id="5" name="Picture 4">
+            <a:extLst>
+              <a:ext uri="{FF2B5EF4-FFF2-40B4-BE49-F238E27FC236}">
+                <a16:creationId xmlns:a16="http://schemas.microsoft.com/office/drawing/2014/main" id="{615F7C77-63B9-DC7F-61CA-A37407431BB6}"/>
+              </a:ext>
+            </a:extLst>
+          </p:cNvPr>
+          <p:cNvPicPr>
+            <a:picLocks noChangeAspect="1"/>
+          </p:cNvPicPr>
+          <p:nvPr/>
+        </p:nvPicPr>
+        <p:blipFill>
+          <a:blip r:embed="rId12">
+            <a:extLst>
+              <a:ext uri="{28A0092B-C50C-407E-A947-70E740481C1C}">
+                <a14:useLocalDpi xmlns:a14="http://schemas.microsoft.com/office/drawing/2010/main" val="0"/>
+              </a:ext>
+            </a:extLst>
+          </a:blip>
+          <a:srcRect/>
+          <a:stretch/>
+        </p:blipFill>
+        <p:spPr>
+          <a:xfrm>
+            <a:off x="3576637" y="891112"/>
+            <a:ext cx="1990725" cy="1097450"/>
+          </a:xfrm>
+          <a:prstGeom prst="rect">
+            <a:avLst/>
+          </a:prstGeom>
+          <a:effectLst>
+            <a:outerShdw blurRad="50800" dist="38100" dir="2700000" algn="tl" rotWithShape="0">
+              <a:prstClr val="black">
+                <a:alpha val="40000"/>
+              </a:prstClr>
+            </a:outerShdw>
+          </a:effectLst>
+        </p:spPr>
+      </p:pic>
+      <p:sp>
+        <p:nvSpPr>
+          <p:cNvPr id="6" name="Title 5">
+            <a:extLst>
+              <a:ext uri="{FF2B5EF4-FFF2-40B4-BE49-F238E27FC236}">
+                <a16:creationId xmlns:a16="http://schemas.microsoft.com/office/drawing/2014/main" id="{2F1FEA9F-63CA-F05E-7691-DD31424A9BD0}"/>
+              </a:ext>
+            </a:extLst>
+          </p:cNvPr>
+          <p:cNvSpPr>
+            <a:spLocks noGrp="1"/>
+          </p:cNvSpPr>
+          <p:nvPr>
+            <p:ph type="title"/>
+          </p:nvPr>
+        </p:nvSpPr>
+        <p:spPr>
+          <a:xfrm>
+            <a:off x="122131" y="508423"/>
+            <a:ext cx="7543800" cy="702302"/>
+          </a:xfrm>
+        </p:spPr>
+        <p:txBody>
+          <a:bodyPr>
+            <a:normAutofit/>
+          </a:bodyPr>
+          <a:lstStyle/>
+          <a:p>
+            <a:r>
+              <a:rPr lang="en-GB" sz="3600" dirty="0"/>
+              <a:t>Connect the dots</a:t>
+            </a:r>
+          </a:p>
+        </p:txBody>
+      </p:sp>
+      <p:pic>
+        <p:nvPicPr>
+          <p:cNvPr id="7" name="Graphic 6">
+            <a:extLst>
+              <a:ext uri="{FF2B5EF4-FFF2-40B4-BE49-F238E27FC236}">
+                <a16:creationId xmlns:a16="http://schemas.microsoft.com/office/drawing/2014/main" id="{B9354D22-AFFA-7027-6324-7BC8B9CEDA22}"/>
+              </a:ext>
+            </a:extLst>
+          </p:cNvPr>
+          <p:cNvPicPr>
+            <a:picLocks noChangeAspect="1"/>
+          </p:cNvPicPr>
+          <p:nvPr/>
+        </p:nvPicPr>
+        <p:blipFill>
+          <a:blip r:embed="rId8">
+            <a:extLst>
+              <a:ext uri="{96DAC541-7B7A-43D3-8B79-37D633B846F1}">
+                <asvg:svgBlip xmlns:asvg="http://schemas.microsoft.com/office/drawing/2016/SVG/main" r:embed="rId9"/>
+              </a:ext>
+            </a:extLst>
+          </a:blip>
+          <a:stretch>
+            <a:fillRect/>
+          </a:stretch>
+        </p:blipFill>
+        <p:spPr>
+          <a:xfrm>
+            <a:off x="1201084" y="1728257"/>
+            <a:ext cx="411268" cy="411268"/>
+          </a:xfrm>
+          <a:prstGeom prst="rect">
+            <a:avLst/>
+          </a:prstGeom>
+        </p:spPr>
+      </p:pic>
+      <p:sp>
+        <p:nvSpPr>
+          <p:cNvPr id="8" name="Title 5">
+            <a:extLst>
+              <a:ext uri="{FF2B5EF4-FFF2-40B4-BE49-F238E27FC236}">
+                <a16:creationId xmlns:a16="http://schemas.microsoft.com/office/drawing/2014/main" id="{A1321A41-7C9C-F5C8-4700-C6FEC3FE9CB7}"/>
+              </a:ext>
+            </a:extLst>
+          </p:cNvPr>
+          <p:cNvSpPr txBox="1">
+            <a:spLocks/>
+          </p:cNvSpPr>
+          <p:nvPr/>
+        </p:nvSpPr>
+        <p:spPr>
+          <a:xfrm>
+            <a:off x="1021854" y="5772721"/>
+            <a:ext cx="7543800" cy="702302"/>
+          </a:xfrm>
+          <a:prstGeom prst="rect">
+            <a:avLst/>
+          </a:prstGeom>
+        </p:spPr>
+        <p:txBody>
+          <a:bodyPr vert="horz" lIns="91440" tIns="45720" rIns="91440" bIns="45720" rtlCol="0" anchor="t">
+            <a:normAutofit/>
+          </a:bodyPr>
+          <a:lstStyle>
+            <a:lvl1pPr algn="l" defTabSz="914400" rtl="0" eaLnBrk="1" latinLnBrk="0" hangingPunct="1">
+              <a:lnSpc>
+                <a:spcPct val="85000"/>
+              </a:lnSpc>
+              <a:spcBef>
+                <a:spcPct val="0"/>
+              </a:spcBef>
+              <a:buNone/>
+              <a:defRPr sz="4800" kern="1200" spc="-50" baseline="0">
+                <a:solidFill>
+                  <a:schemeClr val="tx1">
+                    <a:lumMod val="75000"/>
+                    <a:lumOff val="25000"/>
+                  </a:schemeClr>
+                </a:solidFill>
+                <a:latin typeface="+mj-lt"/>
+                <a:ea typeface="+mj-ea"/>
+                <a:cs typeface="+mj-cs"/>
+              </a:defRPr>
+            </a:lvl1pPr>
+          </a:lstStyle>
+          <a:p>
+            <a:pPr algn="r"/>
+            <a:r>
+              <a:rPr lang="en-GB" sz="3600" dirty="0"/>
+              <a:t>Straight through architecture</a:t>
+            </a:r>
+          </a:p>
+        </p:txBody>
+      </p:sp>
     </p:spTree>
     <p:extLst>
       <p:ext uri="{BB962C8B-B14F-4D97-AF65-F5344CB8AC3E}">
         <p14:creationId xmlns:p14="http://schemas.microsoft.com/office/powerpoint/2010/main" val="2336054547"/>
+      </p:ext>
+    </p:extLst>
+  </p:cSld>
+  <p:clrMapOvr>
+    <a:masterClrMapping/>
+  </p:clrMapOvr>
+</p:sld>
+</file>
+
+<file path=ppt/slides/slide3.xml><?xml version="1.0" encoding="utf-8"?>
+<p:sld xmlns:a="http://schemas.openxmlformats.org/drawingml/2006/main" xmlns:r="http://schemas.openxmlformats.org/officeDocument/2006/relationships" xmlns:p="http://schemas.openxmlformats.org/presentationml/2006/main">
+  <p:cSld>
+    <p:spTree>
+      <p:nvGrpSpPr>
+        <p:cNvPr id="1" name=""/>
+        <p:cNvGrpSpPr/>
+        <p:nvPr/>
+      </p:nvGrpSpPr>
+      <p:grpSpPr>
+        <a:xfrm>
+          <a:off x="0" y="0"/>
+          <a:ext cx="0" cy="0"/>
+          <a:chOff x="0" y="0"/>
+          <a:chExt cx="0" cy="0"/>
+        </a:xfrm>
+      </p:grpSpPr>
+      <p:sp>
+        <p:nvSpPr>
+          <p:cNvPr id="47" name="Rectangle 46">
+            <a:extLst>
+              <a:ext uri="{FF2B5EF4-FFF2-40B4-BE49-F238E27FC236}">
+                <a16:creationId xmlns:a16="http://schemas.microsoft.com/office/drawing/2014/main" id="{9FEBBC08-3752-64F8-7753-3AD1E47BBB51}"/>
+              </a:ext>
+            </a:extLst>
+          </p:cNvPr>
+          <p:cNvSpPr/>
+          <p:nvPr/>
+        </p:nvSpPr>
+        <p:spPr>
+          <a:xfrm>
+            <a:off x="0" y="355600"/>
+            <a:ext cx="9144000" cy="6127750"/>
+          </a:xfrm>
+          <a:prstGeom prst="rect">
+            <a:avLst/>
+          </a:prstGeom>
+          <a:solidFill>
+            <a:schemeClr val="bg1"/>
+          </a:solidFill>
+          <a:ln>
+            <a:noFill/>
+          </a:ln>
+        </p:spPr>
+        <p:style>
+          <a:lnRef idx="2">
+            <a:schemeClr val="accent1">
+              <a:shade val="50000"/>
+            </a:schemeClr>
+          </a:lnRef>
+          <a:fillRef idx="1">
+            <a:schemeClr val="accent1"/>
+          </a:fillRef>
+          <a:effectRef idx="0">
+            <a:schemeClr val="accent1"/>
+          </a:effectRef>
+          <a:fontRef idx="minor">
+            <a:schemeClr val="lt1"/>
+          </a:fontRef>
+        </p:style>
+        <p:txBody>
+          <a:bodyPr rtlCol="0" anchor="ctr"/>
+          <a:lstStyle/>
+          <a:p>
+            <a:pPr algn="ctr"/>
+            <a:endParaRPr lang="en-GB"/>
+          </a:p>
+        </p:txBody>
+      </p:sp>
+      <p:sp>
+        <p:nvSpPr>
+          <p:cNvPr id="2" name="Title 1">
+            <a:extLst>
+              <a:ext uri="{FF2B5EF4-FFF2-40B4-BE49-F238E27FC236}">
+                <a16:creationId xmlns:a16="http://schemas.microsoft.com/office/drawing/2014/main" id="{306B8656-85DF-996C-A8F0-6A34E19E8DD0}"/>
+              </a:ext>
+            </a:extLst>
+          </p:cNvPr>
+          <p:cNvSpPr>
+            <a:spLocks noGrp="1"/>
+          </p:cNvSpPr>
+          <p:nvPr>
+            <p:ph type="title"/>
+          </p:nvPr>
+        </p:nvSpPr>
+        <p:spPr>
+          <a:xfrm>
+            <a:off x="216285" y="637755"/>
+            <a:ext cx="7543800" cy="702302"/>
+          </a:xfrm>
+        </p:spPr>
+        <p:txBody>
+          <a:bodyPr>
+            <a:normAutofit fontScale="90000"/>
+          </a:bodyPr>
+          <a:lstStyle/>
+          <a:p>
+            <a:r>
+              <a:rPr lang="en-GB" dirty="0"/>
+              <a:t>Story Map</a:t>
+            </a:r>
+          </a:p>
+        </p:txBody>
+      </p:sp>
+      <p:sp>
+        <p:nvSpPr>
+          <p:cNvPr id="3" name="Rectangle 2">
+            <a:extLst>
+              <a:ext uri="{FF2B5EF4-FFF2-40B4-BE49-F238E27FC236}">
+                <a16:creationId xmlns:a16="http://schemas.microsoft.com/office/drawing/2014/main" id="{1ED78D7D-CB16-17FA-7073-5E3273A61E4C}"/>
+              </a:ext>
+            </a:extLst>
+          </p:cNvPr>
+          <p:cNvSpPr/>
+          <p:nvPr/>
+        </p:nvSpPr>
+        <p:spPr>
+          <a:xfrm>
+            <a:off x="263725" y="2283232"/>
+            <a:ext cx="792000" cy="504000"/>
+          </a:xfrm>
+          <a:prstGeom prst="rect">
+            <a:avLst/>
+          </a:prstGeom>
+          <a:solidFill>
+            <a:srgbClr val="EEF0A2"/>
+          </a:solidFill>
+          <a:ln>
+            <a:noFill/>
+          </a:ln>
+          <a:effectLst>
+            <a:outerShdw blurRad="50800" dist="38100" dir="2700000" algn="tl" rotWithShape="0">
+              <a:prstClr val="black">
+                <a:alpha val="40000"/>
+              </a:prstClr>
+            </a:outerShdw>
+          </a:effectLst>
+        </p:spPr>
+        <p:style>
+          <a:lnRef idx="2">
+            <a:schemeClr val="accent1">
+              <a:shade val="50000"/>
+            </a:schemeClr>
+          </a:lnRef>
+          <a:fillRef idx="1">
+            <a:schemeClr val="accent1"/>
+          </a:fillRef>
+          <a:effectRef idx="0">
+            <a:schemeClr val="accent1"/>
+          </a:effectRef>
+          <a:fontRef idx="minor">
+            <a:schemeClr val="lt1"/>
+          </a:fontRef>
+        </p:style>
+        <p:txBody>
+          <a:bodyPr rtlCol="0" anchor="ctr"/>
+          <a:lstStyle/>
+          <a:p>
+            <a:pPr algn="ctr"/>
+            <a:r>
+              <a:rPr lang="en-GB" sz="1000" dirty="0">
+                <a:solidFill>
+                  <a:schemeClr val="tx1"/>
+                </a:solidFill>
+              </a:rPr>
+              <a:t>Register</a:t>
+            </a:r>
+          </a:p>
+        </p:txBody>
+      </p:sp>
+      <p:sp>
+        <p:nvSpPr>
+          <p:cNvPr id="4" name="Rectangle 3">
+            <a:extLst>
+              <a:ext uri="{FF2B5EF4-FFF2-40B4-BE49-F238E27FC236}">
+                <a16:creationId xmlns:a16="http://schemas.microsoft.com/office/drawing/2014/main" id="{574F92D4-8200-E501-14D3-B962DDA8E9F5}"/>
+              </a:ext>
+            </a:extLst>
+          </p:cNvPr>
+          <p:cNvSpPr/>
+          <p:nvPr/>
+        </p:nvSpPr>
+        <p:spPr>
+          <a:xfrm>
+            <a:off x="263725" y="1644213"/>
+            <a:ext cx="792000" cy="504000"/>
+          </a:xfrm>
+          <a:prstGeom prst="rect">
+            <a:avLst/>
+          </a:prstGeom>
+          <a:solidFill>
+            <a:srgbClr val="A2D4F0"/>
+          </a:solidFill>
+          <a:ln>
+            <a:noFill/>
+          </a:ln>
+          <a:effectLst>
+            <a:outerShdw blurRad="50800" dist="38100" dir="2700000" algn="tl" rotWithShape="0">
+              <a:prstClr val="black">
+                <a:alpha val="40000"/>
+              </a:prstClr>
+            </a:outerShdw>
+          </a:effectLst>
+        </p:spPr>
+        <p:style>
+          <a:lnRef idx="2">
+            <a:schemeClr val="accent1">
+              <a:shade val="50000"/>
+            </a:schemeClr>
+          </a:lnRef>
+          <a:fillRef idx="1">
+            <a:schemeClr val="accent1"/>
+          </a:fillRef>
+          <a:effectRef idx="0">
+            <a:schemeClr val="accent1"/>
+          </a:effectRef>
+          <a:fontRef idx="minor">
+            <a:schemeClr val="lt1"/>
+          </a:fontRef>
+        </p:style>
+        <p:txBody>
+          <a:bodyPr rtlCol="0" anchor="ctr"/>
+          <a:lstStyle/>
+          <a:p>
+            <a:pPr algn="ctr"/>
+            <a:r>
+              <a:rPr lang="en-GB" sz="1000" dirty="0">
+                <a:solidFill>
+                  <a:schemeClr val="tx1"/>
+                </a:solidFill>
+              </a:rPr>
+              <a:t>Create an Interaction</a:t>
+            </a:r>
+          </a:p>
+        </p:txBody>
+      </p:sp>
+      <p:sp>
+        <p:nvSpPr>
+          <p:cNvPr id="5" name="Rectangle 4">
+            <a:extLst>
+              <a:ext uri="{FF2B5EF4-FFF2-40B4-BE49-F238E27FC236}">
+                <a16:creationId xmlns:a16="http://schemas.microsoft.com/office/drawing/2014/main" id="{B94300BF-6B02-3271-5D04-83909ED49BCC}"/>
+              </a:ext>
+            </a:extLst>
+          </p:cNvPr>
+          <p:cNvSpPr/>
+          <p:nvPr/>
+        </p:nvSpPr>
+        <p:spPr>
+          <a:xfrm>
+            <a:off x="1163635" y="2283232"/>
+            <a:ext cx="792000" cy="504000"/>
+          </a:xfrm>
+          <a:prstGeom prst="rect">
+            <a:avLst/>
+          </a:prstGeom>
+          <a:solidFill>
+            <a:srgbClr val="EEF0A2"/>
+          </a:solidFill>
+          <a:ln>
+            <a:noFill/>
+          </a:ln>
+          <a:effectLst>
+            <a:outerShdw blurRad="50800" dist="38100" dir="2700000" algn="tl" rotWithShape="0">
+              <a:prstClr val="black">
+                <a:alpha val="40000"/>
+              </a:prstClr>
+            </a:outerShdw>
+          </a:effectLst>
+        </p:spPr>
+        <p:style>
+          <a:lnRef idx="2">
+            <a:schemeClr val="accent1">
+              <a:shade val="50000"/>
+            </a:schemeClr>
+          </a:lnRef>
+          <a:fillRef idx="1">
+            <a:schemeClr val="accent1"/>
+          </a:fillRef>
+          <a:effectRef idx="0">
+            <a:schemeClr val="accent1"/>
+          </a:effectRef>
+          <a:fontRef idx="minor">
+            <a:schemeClr val="lt1"/>
+          </a:fontRef>
+        </p:style>
+        <p:txBody>
+          <a:bodyPr rtlCol="0" anchor="ctr"/>
+          <a:lstStyle/>
+          <a:p>
+            <a:pPr algn="ctr"/>
+            <a:r>
+              <a:rPr lang="en-GB" sz="1000" dirty="0">
+                <a:solidFill>
+                  <a:schemeClr val="tx1"/>
+                </a:solidFill>
+              </a:rPr>
+              <a:t>Notify</a:t>
+            </a:r>
+          </a:p>
+          <a:p>
+            <a:pPr algn="ctr"/>
+            <a:r>
+              <a:rPr lang="en-GB" sz="1000" dirty="0">
+                <a:solidFill>
+                  <a:schemeClr val="tx1"/>
+                </a:solidFill>
+              </a:rPr>
+              <a:t>Proximity</a:t>
+            </a:r>
+          </a:p>
+        </p:txBody>
+      </p:sp>
+      <p:sp>
+        <p:nvSpPr>
+          <p:cNvPr id="6" name="Rectangle 5">
+            <a:extLst>
+              <a:ext uri="{FF2B5EF4-FFF2-40B4-BE49-F238E27FC236}">
+                <a16:creationId xmlns:a16="http://schemas.microsoft.com/office/drawing/2014/main" id="{82CC9AA4-D813-2CDF-74EB-17389FDD4B5F}"/>
+              </a:ext>
+            </a:extLst>
+          </p:cNvPr>
+          <p:cNvSpPr/>
+          <p:nvPr/>
+        </p:nvSpPr>
+        <p:spPr>
+          <a:xfrm>
+            <a:off x="1989543" y="2283232"/>
+            <a:ext cx="792000" cy="504000"/>
+          </a:xfrm>
+          <a:prstGeom prst="rect">
+            <a:avLst/>
+          </a:prstGeom>
+          <a:solidFill>
+            <a:srgbClr val="EEF0A2"/>
+          </a:solidFill>
+          <a:ln>
+            <a:noFill/>
+          </a:ln>
+          <a:effectLst>
+            <a:outerShdw blurRad="50800" dist="38100" dir="2700000" algn="tl" rotWithShape="0">
+              <a:prstClr val="black">
+                <a:alpha val="40000"/>
+              </a:prstClr>
+            </a:outerShdw>
+          </a:effectLst>
+        </p:spPr>
+        <p:style>
+          <a:lnRef idx="2">
+            <a:schemeClr val="accent1">
+              <a:shade val="50000"/>
+            </a:schemeClr>
+          </a:lnRef>
+          <a:fillRef idx="1">
+            <a:schemeClr val="accent1"/>
+          </a:fillRef>
+          <a:effectRef idx="0">
+            <a:schemeClr val="accent1"/>
+          </a:effectRef>
+          <a:fontRef idx="minor">
+            <a:schemeClr val="lt1"/>
+          </a:fontRef>
+        </p:style>
+        <p:txBody>
+          <a:bodyPr rtlCol="0" anchor="ctr"/>
+          <a:lstStyle/>
+          <a:p>
+            <a:pPr algn="ctr"/>
+            <a:r>
+              <a:rPr lang="en-GB" sz="1000" dirty="0">
+                <a:solidFill>
+                  <a:schemeClr val="tx1"/>
+                </a:solidFill>
+              </a:rPr>
+              <a:t>Interact</a:t>
+            </a:r>
+          </a:p>
+        </p:txBody>
+      </p:sp>
+      <p:sp>
+        <p:nvSpPr>
+          <p:cNvPr id="7" name="Rectangle 6">
+            <a:extLst>
+              <a:ext uri="{FF2B5EF4-FFF2-40B4-BE49-F238E27FC236}">
+                <a16:creationId xmlns:a16="http://schemas.microsoft.com/office/drawing/2014/main" id="{70DB9E57-7F78-5BFD-A975-09406FBDB312}"/>
+              </a:ext>
+            </a:extLst>
+          </p:cNvPr>
+          <p:cNvSpPr/>
+          <p:nvPr/>
+        </p:nvSpPr>
+        <p:spPr>
+          <a:xfrm>
+            <a:off x="2889455" y="2295744"/>
+            <a:ext cx="792000" cy="504000"/>
+          </a:xfrm>
+          <a:prstGeom prst="rect">
+            <a:avLst/>
+          </a:prstGeom>
+          <a:solidFill>
+            <a:srgbClr val="EEF0A2"/>
+          </a:solidFill>
+          <a:ln>
+            <a:noFill/>
+          </a:ln>
+          <a:effectLst>
+            <a:outerShdw blurRad="50800" dist="38100" dir="2700000" algn="tl" rotWithShape="0">
+              <a:prstClr val="black">
+                <a:alpha val="40000"/>
+              </a:prstClr>
+            </a:outerShdw>
+          </a:effectLst>
+        </p:spPr>
+        <p:style>
+          <a:lnRef idx="2">
+            <a:schemeClr val="accent1">
+              <a:shade val="50000"/>
+            </a:schemeClr>
+          </a:lnRef>
+          <a:fillRef idx="1">
+            <a:schemeClr val="accent1"/>
+          </a:fillRef>
+          <a:effectRef idx="0">
+            <a:schemeClr val="accent1"/>
+          </a:effectRef>
+          <a:fontRef idx="minor">
+            <a:schemeClr val="lt1"/>
+          </a:fontRef>
+        </p:style>
+        <p:txBody>
+          <a:bodyPr rtlCol="0" anchor="ctr"/>
+          <a:lstStyle/>
+          <a:p>
+            <a:pPr algn="ctr"/>
+            <a:r>
+              <a:rPr lang="en-GB" sz="1000" dirty="0">
+                <a:solidFill>
+                  <a:schemeClr val="tx1"/>
+                </a:solidFill>
+              </a:rPr>
+              <a:t>Share</a:t>
+            </a:r>
+          </a:p>
+        </p:txBody>
+      </p:sp>
+      <p:sp>
+        <p:nvSpPr>
+          <p:cNvPr id="8" name="Rectangle 7">
+            <a:extLst>
+              <a:ext uri="{FF2B5EF4-FFF2-40B4-BE49-F238E27FC236}">
+                <a16:creationId xmlns:a16="http://schemas.microsoft.com/office/drawing/2014/main" id="{1176F745-5158-1713-F866-D00864A950C7}"/>
+              </a:ext>
+            </a:extLst>
+          </p:cNvPr>
+          <p:cNvSpPr/>
+          <p:nvPr/>
+        </p:nvSpPr>
+        <p:spPr>
+          <a:xfrm>
+            <a:off x="263725" y="2973784"/>
+            <a:ext cx="792000" cy="504000"/>
+          </a:xfrm>
+          <a:prstGeom prst="rect">
+            <a:avLst/>
+          </a:prstGeom>
+          <a:solidFill>
+            <a:srgbClr val="B8F0A2"/>
+          </a:solidFill>
+          <a:ln>
+            <a:noFill/>
+          </a:ln>
+          <a:effectLst>
+            <a:outerShdw blurRad="50800" dist="38100" dir="2700000" algn="tl" rotWithShape="0">
+              <a:prstClr val="black">
+                <a:alpha val="40000"/>
+              </a:prstClr>
+            </a:outerShdw>
+          </a:effectLst>
+        </p:spPr>
+        <p:style>
+          <a:lnRef idx="2">
+            <a:schemeClr val="accent1">
+              <a:shade val="50000"/>
+            </a:schemeClr>
+          </a:lnRef>
+          <a:fillRef idx="1">
+            <a:schemeClr val="accent1"/>
+          </a:fillRef>
+          <a:effectRef idx="0">
+            <a:schemeClr val="accent1"/>
+          </a:effectRef>
+          <a:fontRef idx="minor">
+            <a:schemeClr val="lt1"/>
+          </a:fontRef>
+        </p:style>
+        <p:txBody>
+          <a:bodyPr rtlCol="0" anchor="ctr"/>
+          <a:lstStyle/>
+          <a:p>
+            <a:pPr algn="ctr"/>
+            <a:r>
+              <a:rPr lang="en-GB" sz="1000" dirty="0">
+                <a:solidFill>
+                  <a:schemeClr val="tx1"/>
+                </a:solidFill>
+              </a:rPr>
+              <a:t>Create profile for Citizen</a:t>
+            </a:r>
+          </a:p>
+        </p:txBody>
+      </p:sp>
+      <p:sp>
+        <p:nvSpPr>
+          <p:cNvPr id="9" name="Rectangle 8">
+            <a:extLst>
+              <a:ext uri="{FF2B5EF4-FFF2-40B4-BE49-F238E27FC236}">
+                <a16:creationId xmlns:a16="http://schemas.microsoft.com/office/drawing/2014/main" id="{48BD0ECC-2F2D-686A-3984-EB545A77A25A}"/>
+              </a:ext>
+            </a:extLst>
+          </p:cNvPr>
+          <p:cNvSpPr/>
+          <p:nvPr/>
+        </p:nvSpPr>
+        <p:spPr>
+          <a:xfrm>
+            <a:off x="3814049" y="1623453"/>
+            <a:ext cx="792000" cy="504000"/>
+          </a:xfrm>
+          <a:prstGeom prst="rect">
+            <a:avLst/>
+          </a:prstGeom>
+          <a:solidFill>
+            <a:srgbClr val="A2D4F0"/>
+          </a:solidFill>
+          <a:ln>
+            <a:noFill/>
+          </a:ln>
+          <a:effectLst>
+            <a:outerShdw blurRad="50800" dist="38100" dir="2700000" algn="tl" rotWithShape="0">
+              <a:prstClr val="black">
+                <a:alpha val="40000"/>
+              </a:prstClr>
+            </a:outerShdw>
+          </a:effectLst>
+        </p:spPr>
+        <p:style>
+          <a:lnRef idx="2">
+            <a:schemeClr val="accent1">
+              <a:shade val="50000"/>
+            </a:schemeClr>
+          </a:lnRef>
+          <a:fillRef idx="1">
+            <a:schemeClr val="accent1"/>
+          </a:fillRef>
+          <a:effectRef idx="0">
+            <a:schemeClr val="accent1"/>
+          </a:effectRef>
+          <a:fontRef idx="minor">
+            <a:schemeClr val="lt1"/>
+          </a:fontRef>
+        </p:style>
+        <p:txBody>
+          <a:bodyPr rtlCol="0" anchor="ctr"/>
+          <a:lstStyle/>
+          <a:p>
+            <a:pPr algn="ctr"/>
+            <a:r>
+              <a:rPr lang="en-GB" sz="1000" dirty="0">
+                <a:solidFill>
+                  <a:schemeClr val="tx1"/>
+                </a:solidFill>
+              </a:rPr>
+              <a:t>Citizen Redeems Points</a:t>
+            </a:r>
+          </a:p>
+        </p:txBody>
+      </p:sp>
+      <p:sp>
+        <p:nvSpPr>
+          <p:cNvPr id="10" name="Rectangle 9">
+            <a:extLst>
+              <a:ext uri="{FF2B5EF4-FFF2-40B4-BE49-F238E27FC236}">
+                <a16:creationId xmlns:a16="http://schemas.microsoft.com/office/drawing/2014/main" id="{BD3D8132-6280-236B-2B38-4BD6D43A8F65}"/>
+              </a:ext>
+            </a:extLst>
+          </p:cNvPr>
+          <p:cNvSpPr/>
+          <p:nvPr/>
+        </p:nvSpPr>
+        <p:spPr>
+          <a:xfrm>
+            <a:off x="4785821" y="1601520"/>
+            <a:ext cx="792000" cy="504000"/>
+          </a:xfrm>
+          <a:prstGeom prst="rect">
+            <a:avLst/>
+          </a:prstGeom>
+          <a:solidFill>
+            <a:srgbClr val="A2D4F0"/>
+          </a:solidFill>
+          <a:ln>
+            <a:noFill/>
+          </a:ln>
+          <a:effectLst>
+            <a:outerShdw blurRad="50800" dist="38100" dir="2700000" algn="tl" rotWithShape="0">
+              <a:prstClr val="black">
+                <a:alpha val="40000"/>
+              </a:prstClr>
+            </a:outerShdw>
+          </a:effectLst>
+        </p:spPr>
+        <p:style>
+          <a:lnRef idx="2">
+            <a:schemeClr val="accent1">
+              <a:shade val="50000"/>
+            </a:schemeClr>
+          </a:lnRef>
+          <a:fillRef idx="1">
+            <a:schemeClr val="accent1"/>
+          </a:fillRef>
+          <a:effectRef idx="0">
+            <a:schemeClr val="accent1"/>
+          </a:effectRef>
+          <a:fontRef idx="minor">
+            <a:schemeClr val="lt1"/>
+          </a:fontRef>
+        </p:style>
+        <p:txBody>
+          <a:bodyPr rtlCol="0" anchor="ctr"/>
+          <a:lstStyle/>
+          <a:p>
+            <a:pPr algn="ctr"/>
+            <a:r>
+              <a:rPr lang="en-GB" sz="1000" dirty="0">
+                <a:solidFill>
+                  <a:schemeClr val="tx1"/>
+                </a:solidFill>
+              </a:rPr>
+              <a:t>Officer Redeems Points</a:t>
+            </a:r>
+          </a:p>
+        </p:txBody>
+      </p:sp>
+      <p:sp>
+        <p:nvSpPr>
+          <p:cNvPr id="11" name="Rectangle 10">
+            <a:extLst>
+              <a:ext uri="{FF2B5EF4-FFF2-40B4-BE49-F238E27FC236}">
+                <a16:creationId xmlns:a16="http://schemas.microsoft.com/office/drawing/2014/main" id="{65B5EEE0-27D4-E733-AE5D-AB1DF7289DFC}"/>
+              </a:ext>
+            </a:extLst>
+          </p:cNvPr>
+          <p:cNvSpPr/>
+          <p:nvPr/>
+        </p:nvSpPr>
+        <p:spPr>
+          <a:xfrm>
+            <a:off x="3901975" y="2283232"/>
+            <a:ext cx="792000" cy="504000"/>
+          </a:xfrm>
+          <a:prstGeom prst="rect">
+            <a:avLst/>
+          </a:prstGeom>
+          <a:solidFill>
+            <a:srgbClr val="EEF0A2"/>
+          </a:solidFill>
+          <a:ln>
+            <a:noFill/>
+          </a:ln>
+          <a:effectLst>
+            <a:outerShdw blurRad="50800" dist="38100" dir="2700000" algn="tl" rotWithShape="0">
+              <a:prstClr val="black">
+                <a:alpha val="40000"/>
+              </a:prstClr>
+            </a:outerShdw>
+          </a:effectLst>
+        </p:spPr>
+        <p:style>
+          <a:lnRef idx="2">
+            <a:schemeClr val="accent1">
+              <a:shade val="50000"/>
+            </a:schemeClr>
+          </a:lnRef>
+          <a:fillRef idx="1">
+            <a:schemeClr val="accent1"/>
+          </a:fillRef>
+          <a:effectRef idx="0">
+            <a:schemeClr val="accent1"/>
+          </a:effectRef>
+          <a:fontRef idx="minor">
+            <a:schemeClr val="lt1"/>
+          </a:fontRef>
+        </p:style>
+        <p:txBody>
+          <a:bodyPr rtlCol="0" anchor="ctr"/>
+          <a:lstStyle/>
+          <a:p>
+            <a:pPr algn="ctr"/>
+            <a:r>
+              <a:rPr lang="en-GB" sz="1000" dirty="0">
+                <a:solidFill>
+                  <a:schemeClr val="tx1"/>
+                </a:solidFill>
+              </a:rPr>
+              <a:t>Earn Points</a:t>
+            </a:r>
+          </a:p>
+        </p:txBody>
+      </p:sp>
+      <p:sp>
+        <p:nvSpPr>
+          <p:cNvPr id="12" name="Rectangle 11">
+            <a:extLst>
+              <a:ext uri="{FF2B5EF4-FFF2-40B4-BE49-F238E27FC236}">
+                <a16:creationId xmlns:a16="http://schemas.microsoft.com/office/drawing/2014/main" id="{A91F4DBF-E55D-E202-8068-C8293B75D16E}"/>
+              </a:ext>
+            </a:extLst>
+          </p:cNvPr>
+          <p:cNvSpPr/>
+          <p:nvPr/>
+        </p:nvSpPr>
+        <p:spPr>
+          <a:xfrm>
+            <a:off x="4746760" y="2295744"/>
+            <a:ext cx="792000" cy="504000"/>
+          </a:xfrm>
+          <a:prstGeom prst="rect">
+            <a:avLst/>
+          </a:prstGeom>
+          <a:solidFill>
+            <a:srgbClr val="EEF0A2"/>
+          </a:solidFill>
+          <a:ln>
+            <a:noFill/>
+          </a:ln>
+          <a:effectLst>
+            <a:outerShdw blurRad="50800" dist="38100" dir="2700000" algn="tl" rotWithShape="0">
+              <a:prstClr val="black">
+                <a:alpha val="40000"/>
+              </a:prstClr>
+            </a:outerShdw>
+          </a:effectLst>
+        </p:spPr>
+        <p:style>
+          <a:lnRef idx="2">
+            <a:schemeClr val="accent1">
+              <a:shade val="50000"/>
+            </a:schemeClr>
+          </a:lnRef>
+          <a:fillRef idx="1">
+            <a:schemeClr val="accent1"/>
+          </a:fillRef>
+          <a:effectRef idx="0">
+            <a:schemeClr val="accent1"/>
+          </a:effectRef>
+          <a:fontRef idx="minor">
+            <a:schemeClr val="lt1"/>
+          </a:fontRef>
+        </p:style>
+        <p:txBody>
+          <a:bodyPr rtlCol="0" anchor="ctr"/>
+          <a:lstStyle/>
+          <a:p>
+            <a:pPr algn="ctr"/>
+            <a:r>
+              <a:rPr lang="en-GB" sz="1000" dirty="0">
+                <a:solidFill>
+                  <a:schemeClr val="tx1"/>
+                </a:solidFill>
+              </a:rPr>
+              <a:t>Browse</a:t>
+            </a:r>
+          </a:p>
+        </p:txBody>
+      </p:sp>
+      <p:sp>
+        <p:nvSpPr>
+          <p:cNvPr id="13" name="Rectangle 12">
+            <a:extLst>
+              <a:ext uri="{FF2B5EF4-FFF2-40B4-BE49-F238E27FC236}">
+                <a16:creationId xmlns:a16="http://schemas.microsoft.com/office/drawing/2014/main" id="{5D08B083-C364-8695-4D76-A565065C8C2A}"/>
+              </a:ext>
+            </a:extLst>
+          </p:cNvPr>
+          <p:cNvSpPr/>
+          <p:nvPr/>
+        </p:nvSpPr>
+        <p:spPr>
+          <a:xfrm>
+            <a:off x="5651424" y="2267209"/>
+            <a:ext cx="792000" cy="504000"/>
+          </a:xfrm>
+          <a:prstGeom prst="rect">
+            <a:avLst/>
+          </a:prstGeom>
+          <a:solidFill>
+            <a:srgbClr val="EEF0A2"/>
+          </a:solidFill>
+          <a:ln>
+            <a:noFill/>
+          </a:ln>
+          <a:effectLst>
+            <a:outerShdw blurRad="50800" dist="38100" dir="2700000" algn="tl" rotWithShape="0">
+              <a:prstClr val="black">
+                <a:alpha val="40000"/>
+              </a:prstClr>
+            </a:outerShdw>
+          </a:effectLst>
+        </p:spPr>
+        <p:style>
+          <a:lnRef idx="2">
+            <a:schemeClr val="accent1">
+              <a:shade val="50000"/>
+            </a:schemeClr>
+          </a:lnRef>
+          <a:fillRef idx="1">
+            <a:schemeClr val="accent1"/>
+          </a:fillRef>
+          <a:effectRef idx="0">
+            <a:schemeClr val="accent1"/>
+          </a:effectRef>
+          <a:fontRef idx="minor">
+            <a:schemeClr val="lt1"/>
+          </a:fontRef>
+        </p:style>
+        <p:txBody>
+          <a:bodyPr rtlCol="0" anchor="ctr"/>
+          <a:lstStyle/>
+          <a:p>
+            <a:pPr algn="ctr"/>
+            <a:r>
+              <a:rPr lang="en-GB" sz="1000" dirty="0">
+                <a:solidFill>
+                  <a:schemeClr val="tx1"/>
+                </a:solidFill>
+              </a:rPr>
+              <a:t>Redeem</a:t>
+            </a:r>
+          </a:p>
+        </p:txBody>
+      </p:sp>
+      <p:sp>
+        <p:nvSpPr>
+          <p:cNvPr id="14" name="Rectangle 13">
+            <a:extLst>
+              <a:ext uri="{FF2B5EF4-FFF2-40B4-BE49-F238E27FC236}">
+                <a16:creationId xmlns:a16="http://schemas.microsoft.com/office/drawing/2014/main" id="{6CAF2626-6B73-F990-83B5-0EB2CA3A7453}"/>
+              </a:ext>
+            </a:extLst>
+          </p:cNvPr>
+          <p:cNvSpPr/>
+          <p:nvPr/>
+        </p:nvSpPr>
+        <p:spPr>
+          <a:xfrm>
+            <a:off x="263725" y="3593520"/>
+            <a:ext cx="792000" cy="504000"/>
+          </a:xfrm>
+          <a:prstGeom prst="rect">
+            <a:avLst/>
+          </a:prstGeom>
+          <a:solidFill>
+            <a:srgbClr val="B8F0A2"/>
+          </a:solidFill>
+          <a:ln>
+            <a:noFill/>
+          </a:ln>
+          <a:effectLst>
+            <a:outerShdw blurRad="50800" dist="38100" dir="2700000" algn="tl" rotWithShape="0">
+              <a:prstClr val="black">
+                <a:alpha val="40000"/>
+              </a:prstClr>
+            </a:outerShdw>
+          </a:effectLst>
+        </p:spPr>
+        <p:style>
+          <a:lnRef idx="2">
+            <a:schemeClr val="accent1">
+              <a:shade val="50000"/>
+            </a:schemeClr>
+          </a:lnRef>
+          <a:fillRef idx="1">
+            <a:schemeClr val="accent1"/>
+          </a:fillRef>
+          <a:effectRef idx="0">
+            <a:schemeClr val="accent1"/>
+          </a:effectRef>
+          <a:fontRef idx="minor">
+            <a:schemeClr val="lt1"/>
+          </a:fontRef>
+        </p:style>
+        <p:txBody>
+          <a:bodyPr rtlCol="0" anchor="ctr"/>
+          <a:lstStyle/>
+          <a:p>
+            <a:pPr algn="ctr"/>
+            <a:r>
+              <a:rPr lang="en-GB" sz="1000" dirty="0">
+                <a:solidFill>
+                  <a:schemeClr val="tx1"/>
+                </a:solidFill>
+              </a:rPr>
+              <a:t>Create profile for Officer</a:t>
+            </a:r>
+          </a:p>
+        </p:txBody>
+      </p:sp>
+      <p:sp>
+        <p:nvSpPr>
+          <p:cNvPr id="15" name="Rectangle 14">
+            <a:extLst>
+              <a:ext uri="{FF2B5EF4-FFF2-40B4-BE49-F238E27FC236}">
+                <a16:creationId xmlns:a16="http://schemas.microsoft.com/office/drawing/2014/main" id="{6D2927C0-28A4-20C2-9066-2A2B8853D6AD}"/>
+              </a:ext>
+            </a:extLst>
+          </p:cNvPr>
+          <p:cNvSpPr/>
+          <p:nvPr/>
+        </p:nvSpPr>
+        <p:spPr>
+          <a:xfrm>
+            <a:off x="216285" y="4213256"/>
+            <a:ext cx="792000" cy="504000"/>
+          </a:xfrm>
+          <a:prstGeom prst="rect">
+            <a:avLst/>
+          </a:prstGeom>
+          <a:solidFill>
+            <a:srgbClr val="B8F0A2"/>
+          </a:solidFill>
+          <a:ln>
+            <a:noFill/>
+          </a:ln>
+          <a:effectLst>
+            <a:outerShdw blurRad="50800" dist="38100" dir="2700000" algn="tl" rotWithShape="0">
+              <a:prstClr val="black">
+                <a:alpha val="40000"/>
+              </a:prstClr>
+            </a:outerShdw>
+          </a:effectLst>
+        </p:spPr>
+        <p:style>
+          <a:lnRef idx="2">
+            <a:schemeClr val="accent1">
+              <a:shade val="50000"/>
+            </a:schemeClr>
+          </a:lnRef>
+          <a:fillRef idx="1">
+            <a:schemeClr val="accent1"/>
+          </a:fillRef>
+          <a:effectRef idx="0">
+            <a:schemeClr val="accent1"/>
+          </a:effectRef>
+          <a:fontRef idx="minor">
+            <a:schemeClr val="lt1"/>
+          </a:fontRef>
+        </p:style>
+        <p:txBody>
+          <a:bodyPr rtlCol="0" anchor="ctr"/>
+          <a:lstStyle/>
+          <a:p>
+            <a:pPr algn="ctr"/>
+            <a:r>
+              <a:rPr lang="en-GB" sz="1000" dirty="0">
+                <a:solidFill>
+                  <a:schemeClr val="tx1"/>
+                </a:solidFill>
+              </a:rPr>
+              <a:t>Update profile</a:t>
+            </a:r>
+          </a:p>
+        </p:txBody>
+      </p:sp>
+      <p:sp>
+        <p:nvSpPr>
+          <p:cNvPr id="16" name="Rectangle 15">
+            <a:extLst>
+              <a:ext uri="{FF2B5EF4-FFF2-40B4-BE49-F238E27FC236}">
+                <a16:creationId xmlns:a16="http://schemas.microsoft.com/office/drawing/2014/main" id="{69DD0586-777D-4DCC-D280-F06957E3DE4F}"/>
+              </a:ext>
+            </a:extLst>
+          </p:cNvPr>
+          <p:cNvSpPr/>
+          <p:nvPr/>
+        </p:nvSpPr>
+        <p:spPr>
+          <a:xfrm>
+            <a:off x="3901975" y="2953233"/>
+            <a:ext cx="792000" cy="504000"/>
+          </a:xfrm>
+          <a:prstGeom prst="rect">
+            <a:avLst/>
+          </a:prstGeom>
+          <a:solidFill>
+            <a:srgbClr val="B8F0A2"/>
+          </a:solidFill>
+          <a:ln>
+            <a:noFill/>
+          </a:ln>
+          <a:effectLst>
+            <a:outerShdw blurRad="50800" dist="38100" dir="2700000" algn="tl" rotWithShape="0">
+              <a:prstClr val="black">
+                <a:alpha val="40000"/>
+              </a:prstClr>
+            </a:outerShdw>
+          </a:effectLst>
+        </p:spPr>
+        <p:style>
+          <a:lnRef idx="2">
+            <a:schemeClr val="accent1">
+              <a:shade val="50000"/>
+            </a:schemeClr>
+          </a:lnRef>
+          <a:fillRef idx="1">
+            <a:schemeClr val="accent1"/>
+          </a:fillRef>
+          <a:effectRef idx="0">
+            <a:schemeClr val="accent1"/>
+          </a:effectRef>
+          <a:fontRef idx="minor">
+            <a:schemeClr val="lt1"/>
+          </a:fontRef>
+        </p:style>
+        <p:txBody>
+          <a:bodyPr rtlCol="0" anchor="ctr"/>
+          <a:lstStyle/>
+          <a:p>
+            <a:pPr algn="ctr"/>
+            <a:r>
+              <a:rPr lang="en-GB" sz="1000" dirty="0">
+                <a:solidFill>
+                  <a:schemeClr val="tx1"/>
+                </a:solidFill>
+              </a:rPr>
+              <a:t>Calculate Rewards</a:t>
+            </a:r>
+          </a:p>
+        </p:txBody>
+      </p:sp>
+      <p:sp>
+        <p:nvSpPr>
+          <p:cNvPr id="17" name="Rectangle 16">
+            <a:extLst>
+              <a:ext uri="{FF2B5EF4-FFF2-40B4-BE49-F238E27FC236}">
+                <a16:creationId xmlns:a16="http://schemas.microsoft.com/office/drawing/2014/main" id="{72D4973B-7AAE-5887-00B8-7A03D73C9A5F}"/>
+              </a:ext>
+            </a:extLst>
+          </p:cNvPr>
+          <p:cNvSpPr/>
+          <p:nvPr/>
+        </p:nvSpPr>
+        <p:spPr>
+          <a:xfrm>
+            <a:off x="3901975" y="3587237"/>
+            <a:ext cx="792000" cy="504000"/>
+          </a:xfrm>
+          <a:prstGeom prst="rect">
+            <a:avLst/>
+          </a:prstGeom>
+          <a:solidFill>
+            <a:srgbClr val="B8F0A2"/>
+          </a:solidFill>
+          <a:ln>
+            <a:noFill/>
+          </a:ln>
+          <a:effectLst>
+            <a:outerShdw blurRad="50800" dist="38100" dir="2700000" algn="tl" rotWithShape="0">
+              <a:prstClr val="black">
+                <a:alpha val="40000"/>
+              </a:prstClr>
+            </a:outerShdw>
+          </a:effectLst>
+        </p:spPr>
+        <p:style>
+          <a:lnRef idx="2">
+            <a:schemeClr val="accent1">
+              <a:shade val="50000"/>
+            </a:schemeClr>
+          </a:lnRef>
+          <a:fillRef idx="1">
+            <a:schemeClr val="accent1"/>
+          </a:fillRef>
+          <a:effectRef idx="0">
+            <a:schemeClr val="accent1"/>
+          </a:effectRef>
+          <a:fontRef idx="minor">
+            <a:schemeClr val="lt1"/>
+          </a:fontRef>
+        </p:style>
+        <p:txBody>
+          <a:bodyPr rtlCol="0" anchor="ctr"/>
+          <a:lstStyle/>
+          <a:p>
+            <a:pPr algn="ctr"/>
+            <a:r>
+              <a:rPr lang="en-GB" sz="1000" dirty="0">
+                <a:solidFill>
+                  <a:schemeClr val="tx1"/>
+                </a:solidFill>
+              </a:rPr>
+              <a:t>Add rewards to profile</a:t>
+            </a:r>
+          </a:p>
+        </p:txBody>
+      </p:sp>
+      <p:sp>
+        <p:nvSpPr>
+          <p:cNvPr id="19" name="Rectangle 18">
+            <a:extLst>
+              <a:ext uri="{FF2B5EF4-FFF2-40B4-BE49-F238E27FC236}">
+                <a16:creationId xmlns:a16="http://schemas.microsoft.com/office/drawing/2014/main" id="{87976608-3E49-1ECF-2B44-9B5E1B40902F}"/>
+              </a:ext>
+            </a:extLst>
+          </p:cNvPr>
+          <p:cNvSpPr/>
+          <p:nvPr/>
+        </p:nvSpPr>
+        <p:spPr>
+          <a:xfrm>
+            <a:off x="6729365" y="1641183"/>
+            <a:ext cx="792000" cy="504000"/>
+          </a:xfrm>
+          <a:prstGeom prst="rect">
+            <a:avLst/>
+          </a:prstGeom>
+          <a:solidFill>
+            <a:srgbClr val="A2D4F0"/>
+          </a:solidFill>
+          <a:ln>
+            <a:noFill/>
+          </a:ln>
+          <a:effectLst>
+            <a:outerShdw blurRad="50800" dist="38100" dir="2700000" algn="tl" rotWithShape="0">
+              <a:prstClr val="black">
+                <a:alpha val="40000"/>
+              </a:prstClr>
+            </a:outerShdw>
+          </a:effectLst>
+        </p:spPr>
+        <p:style>
+          <a:lnRef idx="2">
+            <a:schemeClr val="accent1">
+              <a:shade val="50000"/>
+            </a:schemeClr>
+          </a:lnRef>
+          <a:fillRef idx="1">
+            <a:schemeClr val="accent1"/>
+          </a:fillRef>
+          <a:effectRef idx="0">
+            <a:schemeClr val="accent1"/>
+          </a:effectRef>
+          <a:fontRef idx="minor">
+            <a:schemeClr val="lt1"/>
+          </a:fontRef>
+        </p:style>
+        <p:txBody>
+          <a:bodyPr rtlCol="0" anchor="ctr"/>
+          <a:lstStyle/>
+          <a:p>
+            <a:pPr algn="ctr"/>
+            <a:r>
+              <a:rPr lang="en-GB" sz="1000" dirty="0">
+                <a:solidFill>
+                  <a:schemeClr val="tx1"/>
+                </a:solidFill>
+              </a:rPr>
+              <a:t>Capture Analytics</a:t>
+            </a:r>
+          </a:p>
+        </p:txBody>
+      </p:sp>
+      <p:sp>
+        <p:nvSpPr>
+          <p:cNvPr id="20" name="Rectangle 19">
+            <a:extLst>
+              <a:ext uri="{FF2B5EF4-FFF2-40B4-BE49-F238E27FC236}">
+                <a16:creationId xmlns:a16="http://schemas.microsoft.com/office/drawing/2014/main" id="{A08E8E9D-027F-A75E-B436-53B06B032D3F}"/>
+              </a:ext>
+            </a:extLst>
+          </p:cNvPr>
+          <p:cNvSpPr/>
+          <p:nvPr/>
+        </p:nvSpPr>
+        <p:spPr>
+          <a:xfrm>
+            <a:off x="263725" y="5826346"/>
+            <a:ext cx="792000" cy="504000"/>
+          </a:xfrm>
+          <a:prstGeom prst="rect">
+            <a:avLst/>
+          </a:prstGeom>
+          <a:solidFill>
+            <a:srgbClr val="A2D4F0"/>
+          </a:solidFill>
+          <a:ln>
+            <a:noFill/>
+          </a:ln>
+          <a:effectLst>
+            <a:outerShdw blurRad="50800" dist="38100" dir="2700000" algn="tl" rotWithShape="0">
+              <a:prstClr val="black">
+                <a:alpha val="40000"/>
+              </a:prstClr>
+            </a:outerShdw>
+          </a:effectLst>
+        </p:spPr>
+        <p:style>
+          <a:lnRef idx="2">
+            <a:schemeClr val="accent1">
+              <a:shade val="50000"/>
+            </a:schemeClr>
+          </a:lnRef>
+          <a:fillRef idx="1">
+            <a:schemeClr val="accent1"/>
+          </a:fillRef>
+          <a:effectRef idx="0">
+            <a:schemeClr val="accent1"/>
+          </a:effectRef>
+          <a:fontRef idx="minor">
+            <a:schemeClr val="lt1"/>
+          </a:fontRef>
+        </p:style>
+        <p:txBody>
+          <a:bodyPr rtlCol="0" anchor="ctr"/>
+          <a:lstStyle/>
+          <a:p>
+            <a:pPr algn="ctr"/>
+            <a:r>
+              <a:rPr lang="en-GB" sz="1000" dirty="0">
+                <a:solidFill>
+                  <a:schemeClr val="tx1"/>
+                </a:solidFill>
+              </a:rPr>
+              <a:t>Non Functionals</a:t>
+            </a:r>
+          </a:p>
+        </p:txBody>
+      </p:sp>
+      <p:sp>
+        <p:nvSpPr>
+          <p:cNvPr id="21" name="Rectangle 20">
+            <a:extLst>
+              <a:ext uri="{FF2B5EF4-FFF2-40B4-BE49-F238E27FC236}">
+                <a16:creationId xmlns:a16="http://schemas.microsoft.com/office/drawing/2014/main" id="{64FD31F6-CEEB-52D1-2861-FE9F682E6E9B}"/>
+              </a:ext>
+            </a:extLst>
+          </p:cNvPr>
+          <p:cNvSpPr/>
+          <p:nvPr/>
+        </p:nvSpPr>
+        <p:spPr>
+          <a:xfrm>
+            <a:off x="2955272" y="2953233"/>
+            <a:ext cx="792000" cy="504000"/>
+          </a:xfrm>
+          <a:prstGeom prst="rect">
+            <a:avLst/>
+          </a:prstGeom>
+          <a:solidFill>
+            <a:srgbClr val="B8F0A2"/>
+          </a:solidFill>
+          <a:ln>
+            <a:noFill/>
+          </a:ln>
+          <a:effectLst>
+            <a:outerShdw blurRad="50800" dist="38100" dir="2700000" algn="tl" rotWithShape="0">
+              <a:prstClr val="black">
+                <a:alpha val="40000"/>
+              </a:prstClr>
+            </a:outerShdw>
+          </a:effectLst>
+        </p:spPr>
+        <p:style>
+          <a:lnRef idx="2">
+            <a:schemeClr val="accent1">
+              <a:shade val="50000"/>
+            </a:schemeClr>
+          </a:lnRef>
+          <a:fillRef idx="1">
+            <a:schemeClr val="accent1"/>
+          </a:fillRef>
+          <a:effectRef idx="0">
+            <a:schemeClr val="accent1"/>
+          </a:effectRef>
+          <a:fontRef idx="minor">
+            <a:schemeClr val="lt1"/>
+          </a:fontRef>
+        </p:style>
+        <p:txBody>
+          <a:bodyPr rtlCol="0" anchor="ctr"/>
+          <a:lstStyle/>
+          <a:p>
+            <a:pPr algn="ctr"/>
+            <a:r>
+              <a:rPr lang="en-GB" sz="1000" dirty="0">
+                <a:solidFill>
+                  <a:schemeClr val="tx1"/>
+                </a:solidFill>
+              </a:rPr>
+              <a:t>Share to #HeyBlue feed</a:t>
+            </a:r>
+          </a:p>
+        </p:txBody>
+      </p:sp>
+      <p:sp>
+        <p:nvSpPr>
+          <p:cNvPr id="22" name="Rectangle 21">
+            <a:extLst>
+              <a:ext uri="{FF2B5EF4-FFF2-40B4-BE49-F238E27FC236}">
+                <a16:creationId xmlns:a16="http://schemas.microsoft.com/office/drawing/2014/main" id="{60ED45EC-4AE0-7780-86FD-17FE2AB11DAB}"/>
+              </a:ext>
+            </a:extLst>
+          </p:cNvPr>
+          <p:cNvSpPr/>
+          <p:nvPr/>
+        </p:nvSpPr>
+        <p:spPr>
+          <a:xfrm>
+            <a:off x="2967582" y="3540565"/>
+            <a:ext cx="792000" cy="504000"/>
+          </a:xfrm>
+          <a:prstGeom prst="rect">
+            <a:avLst/>
+          </a:prstGeom>
+          <a:solidFill>
+            <a:srgbClr val="B8F0A2"/>
+          </a:solidFill>
+          <a:ln>
+            <a:noFill/>
+          </a:ln>
+          <a:effectLst>
+            <a:outerShdw blurRad="50800" dist="38100" dir="2700000" algn="tl" rotWithShape="0">
+              <a:prstClr val="black">
+                <a:alpha val="40000"/>
+              </a:prstClr>
+            </a:outerShdw>
+          </a:effectLst>
+        </p:spPr>
+        <p:style>
+          <a:lnRef idx="2">
+            <a:schemeClr val="accent1">
+              <a:shade val="50000"/>
+            </a:schemeClr>
+          </a:lnRef>
+          <a:fillRef idx="1">
+            <a:schemeClr val="accent1"/>
+          </a:fillRef>
+          <a:effectRef idx="0">
+            <a:schemeClr val="accent1"/>
+          </a:effectRef>
+          <a:fontRef idx="minor">
+            <a:schemeClr val="lt1"/>
+          </a:fontRef>
+        </p:style>
+        <p:txBody>
+          <a:bodyPr rtlCol="0" anchor="ctr"/>
+          <a:lstStyle/>
+          <a:p>
+            <a:pPr algn="ctr"/>
+            <a:r>
+              <a:rPr lang="en-GB" sz="1000" dirty="0">
+                <a:solidFill>
+                  <a:schemeClr val="tx1"/>
+                </a:solidFill>
+              </a:rPr>
+              <a:t>Share to Social Media</a:t>
+            </a:r>
+          </a:p>
+        </p:txBody>
+      </p:sp>
+      <p:sp>
+        <p:nvSpPr>
+          <p:cNvPr id="24" name="TextBox 23">
+            <a:extLst>
+              <a:ext uri="{FF2B5EF4-FFF2-40B4-BE49-F238E27FC236}">
+                <a16:creationId xmlns:a16="http://schemas.microsoft.com/office/drawing/2014/main" id="{7C8F7F72-9B6F-F8F2-9615-DDAEC85C2A47}"/>
+              </a:ext>
+            </a:extLst>
+          </p:cNvPr>
+          <p:cNvSpPr txBox="1"/>
+          <p:nvPr/>
+        </p:nvSpPr>
+        <p:spPr>
+          <a:xfrm>
+            <a:off x="7857678" y="4768034"/>
+            <a:ext cx="1866898" cy="1600438"/>
+          </a:xfrm>
+          <a:prstGeom prst="rect">
+            <a:avLst/>
+          </a:prstGeom>
+          <a:noFill/>
+        </p:spPr>
+        <p:txBody>
+          <a:bodyPr wrap="square">
+            <a:spAutoFit/>
+          </a:bodyPr>
+          <a:lstStyle/>
+          <a:p>
+            <a:r>
+              <a:rPr lang="en-GB" sz="1400" dirty="0"/>
+              <a:t>Security</a:t>
+            </a:r>
+          </a:p>
+          <a:p>
+            <a:r>
+              <a:rPr lang="en-GB" sz="1400" dirty="0"/>
+              <a:t>Affordability</a:t>
+            </a:r>
+          </a:p>
+          <a:p>
+            <a:r>
+              <a:rPr lang="en-GB" sz="1400" dirty="0"/>
+              <a:t>Usability </a:t>
+            </a:r>
+          </a:p>
+          <a:p>
+            <a:r>
+              <a:rPr lang="en-GB" sz="1400" dirty="0"/>
+              <a:t>Elasticity </a:t>
+            </a:r>
+          </a:p>
+          <a:p>
+            <a:r>
+              <a:rPr lang="en-GB" sz="1400" dirty="0"/>
+              <a:t>Evolvability</a:t>
+            </a:r>
+          </a:p>
+          <a:p>
+            <a:r>
+              <a:rPr lang="en-GB" sz="1400" dirty="0"/>
+              <a:t>Observability</a:t>
+            </a:r>
+          </a:p>
+          <a:p>
+            <a:r>
+              <a:rPr lang="en-GB" sz="1400" dirty="0"/>
+              <a:t>Availability</a:t>
+            </a:r>
+          </a:p>
+        </p:txBody>
+      </p:sp>
+      <p:sp>
+        <p:nvSpPr>
+          <p:cNvPr id="25" name="Rectangle 24">
+            <a:extLst>
+              <a:ext uri="{FF2B5EF4-FFF2-40B4-BE49-F238E27FC236}">
+                <a16:creationId xmlns:a16="http://schemas.microsoft.com/office/drawing/2014/main" id="{C7A64B6E-9F1D-B4C1-27B2-1B5A8B0AC007}"/>
+              </a:ext>
+            </a:extLst>
+          </p:cNvPr>
+          <p:cNvSpPr/>
+          <p:nvPr/>
+        </p:nvSpPr>
+        <p:spPr>
+          <a:xfrm>
+            <a:off x="6968085" y="6051094"/>
+            <a:ext cx="792000" cy="504000"/>
+          </a:xfrm>
+          <a:prstGeom prst="rect">
+            <a:avLst/>
+          </a:prstGeom>
+          <a:solidFill>
+            <a:srgbClr val="B8F0A2"/>
+          </a:solidFill>
+          <a:ln>
+            <a:noFill/>
+          </a:ln>
+          <a:effectLst>
+            <a:outerShdw blurRad="50800" dist="38100" dir="2700000" algn="tl" rotWithShape="0">
+              <a:prstClr val="black">
+                <a:alpha val="40000"/>
+              </a:prstClr>
+            </a:outerShdw>
+          </a:effectLst>
+        </p:spPr>
+        <p:style>
+          <a:lnRef idx="2">
+            <a:schemeClr val="accent1">
+              <a:shade val="50000"/>
+            </a:schemeClr>
+          </a:lnRef>
+          <a:fillRef idx="1">
+            <a:schemeClr val="accent1"/>
+          </a:fillRef>
+          <a:effectRef idx="0">
+            <a:schemeClr val="accent1"/>
+          </a:effectRef>
+          <a:fontRef idx="minor">
+            <a:schemeClr val="lt1"/>
+          </a:fontRef>
+        </p:style>
+        <p:txBody>
+          <a:bodyPr rtlCol="0" anchor="ctr"/>
+          <a:lstStyle/>
+          <a:p>
+            <a:pPr algn="ctr"/>
+            <a:r>
+              <a:rPr lang="en-GB" sz="1000" dirty="0">
+                <a:solidFill>
+                  <a:schemeClr val="tx1"/>
+                </a:solidFill>
+              </a:rPr>
+              <a:t>Task</a:t>
+            </a:r>
+          </a:p>
+        </p:txBody>
+      </p:sp>
+      <p:sp>
+        <p:nvSpPr>
+          <p:cNvPr id="26" name="Rectangle 25">
+            <a:extLst>
+              <a:ext uri="{FF2B5EF4-FFF2-40B4-BE49-F238E27FC236}">
+                <a16:creationId xmlns:a16="http://schemas.microsoft.com/office/drawing/2014/main" id="{9562A0BB-89D5-9F84-ADBC-24D3E3CBE798}"/>
+              </a:ext>
+            </a:extLst>
+          </p:cNvPr>
+          <p:cNvSpPr/>
+          <p:nvPr/>
+        </p:nvSpPr>
+        <p:spPr>
+          <a:xfrm>
+            <a:off x="5671206" y="2879756"/>
+            <a:ext cx="792000" cy="504000"/>
+          </a:xfrm>
+          <a:prstGeom prst="rect">
+            <a:avLst/>
+          </a:prstGeom>
+          <a:solidFill>
+            <a:srgbClr val="F6D7C2"/>
+          </a:solidFill>
+          <a:ln>
+            <a:noFill/>
+          </a:ln>
+          <a:effectLst>
+            <a:outerShdw blurRad="50800" dist="38100" dir="2700000" algn="tl" rotWithShape="0">
+              <a:prstClr val="black">
+                <a:alpha val="40000"/>
+              </a:prstClr>
+            </a:outerShdw>
+          </a:effectLst>
+        </p:spPr>
+        <p:style>
+          <a:lnRef idx="2">
+            <a:schemeClr val="accent1">
+              <a:shade val="50000"/>
+            </a:schemeClr>
+          </a:lnRef>
+          <a:fillRef idx="1">
+            <a:schemeClr val="accent1"/>
+          </a:fillRef>
+          <a:effectRef idx="0">
+            <a:schemeClr val="accent1"/>
+          </a:effectRef>
+          <a:fontRef idx="minor">
+            <a:schemeClr val="lt1"/>
+          </a:fontRef>
+        </p:style>
+        <p:txBody>
+          <a:bodyPr rtlCol="0" anchor="ctr"/>
+          <a:lstStyle/>
+          <a:p>
+            <a:pPr algn="ctr"/>
+            <a:r>
+              <a:rPr lang="en-GB" sz="1000" dirty="0">
+                <a:solidFill>
+                  <a:schemeClr val="tx1"/>
+                </a:solidFill>
+              </a:rPr>
+              <a:t>Find retailers</a:t>
+            </a:r>
+          </a:p>
+        </p:txBody>
+      </p:sp>
+      <p:sp>
+        <p:nvSpPr>
+          <p:cNvPr id="27" name="Rectangle 26">
+            <a:extLst>
+              <a:ext uri="{FF2B5EF4-FFF2-40B4-BE49-F238E27FC236}">
+                <a16:creationId xmlns:a16="http://schemas.microsoft.com/office/drawing/2014/main" id="{BEDC4F8B-D8B3-63FD-1DF9-BEA54570B876}"/>
+              </a:ext>
+            </a:extLst>
+          </p:cNvPr>
+          <p:cNvSpPr/>
+          <p:nvPr/>
+        </p:nvSpPr>
+        <p:spPr>
+          <a:xfrm>
+            <a:off x="5972674" y="5415321"/>
+            <a:ext cx="792000" cy="504000"/>
+          </a:xfrm>
+          <a:prstGeom prst="rect">
+            <a:avLst/>
+          </a:prstGeom>
+          <a:solidFill>
+            <a:srgbClr val="F6D7C2"/>
+          </a:solidFill>
+          <a:ln>
+            <a:noFill/>
+          </a:ln>
+          <a:effectLst>
+            <a:outerShdw blurRad="50800" dist="38100" dir="2700000" algn="tl" rotWithShape="0">
+              <a:prstClr val="black">
+                <a:alpha val="40000"/>
+              </a:prstClr>
+            </a:outerShdw>
+          </a:effectLst>
+        </p:spPr>
+        <p:style>
+          <a:lnRef idx="2">
+            <a:schemeClr val="accent1">
+              <a:shade val="50000"/>
+            </a:schemeClr>
+          </a:lnRef>
+          <a:fillRef idx="1">
+            <a:schemeClr val="accent1"/>
+          </a:fillRef>
+          <a:effectRef idx="0">
+            <a:schemeClr val="accent1"/>
+          </a:effectRef>
+          <a:fontRef idx="minor">
+            <a:schemeClr val="lt1"/>
+          </a:fontRef>
+        </p:style>
+        <p:txBody>
+          <a:bodyPr rtlCol="0" anchor="ctr"/>
+          <a:lstStyle/>
+          <a:p>
+            <a:pPr algn="ctr"/>
+            <a:r>
+              <a:rPr lang="en-GB" sz="1000" dirty="0">
+                <a:solidFill>
+                  <a:schemeClr val="tx1"/>
+                </a:solidFill>
+              </a:rPr>
+              <a:t>Must Have…</a:t>
+            </a:r>
+          </a:p>
+        </p:txBody>
+      </p:sp>
+      <p:sp>
+        <p:nvSpPr>
+          <p:cNvPr id="28" name="Rectangle 27">
+            <a:extLst>
+              <a:ext uri="{FF2B5EF4-FFF2-40B4-BE49-F238E27FC236}">
+                <a16:creationId xmlns:a16="http://schemas.microsoft.com/office/drawing/2014/main" id="{B2BC6399-A991-BE43-4F5C-8037CB775BA0}"/>
+              </a:ext>
+            </a:extLst>
+          </p:cNvPr>
+          <p:cNvSpPr/>
+          <p:nvPr/>
+        </p:nvSpPr>
+        <p:spPr>
+          <a:xfrm>
+            <a:off x="6915176" y="5415321"/>
+            <a:ext cx="792000" cy="504000"/>
+          </a:xfrm>
+          <a:prstGeom prst="rect">
+            <a:avLst/>
+          </a:prstGeom>
+          <a:solidFill>
+            <a:srgbClr val="A2D4F0"/>
+          </a:solidFill>
+          <a:ln>
+            <a:noFill/>
+          </a:ln>
+          <a:effectLst>
+            <a:outerShdw blurRad="50800" dist="38100" dir="2700000" algn="tl" rotWithShape="0">
+              <a:prstClr val="black">
+                <a:alpha val="40000"/>
+              </a:prstClr>
+            </a:outerShdw>
+          </a:effectLst>
+        </p:spPr>
+        <p:style>
+          <a:lnRef idx="2">
+            <a:schemeClr val="accent1">
+              <a:shade val="50000"/>
+            </a:schemeClr>
+          </a:lnRef>
+          <a:fillRef idx="1">
+            <a:schemeClr val="accent1"/>
+          </a:fillRef>
+          <a:effectRef idx="0">
+            <a:schemeClr val="accent1"/>
+          </a:effectRef>
+          <a:fontRef idx="minor">
+            <a:schemeClr val="lt1"/>
+          </a:fontRef>
+        </p:style>
+        <p:txBody>
+          <a:bodyPr rtlCol="0" anchor="ctr"/>
+          <a:lstStyle/>
+          <a:p>
+            <a:pPr algn="ctr"/>
+            <a:r>
+              <a:rPr lang="en-GB" sz="1000" dirty="0">
+                <a:solidFill>
+                  <a:schemeClr val="tx1"/>
+                </a:solidFill>
+              </a:rPr>
+              <a:t>Activity</a:t>
+            </a:r>
+          </a:p>
+        </p:txBody>
+      </p:sp>
+      <p:sp>
+        <p:nvSpPr>
+          <p:cNvPr id="29" name="Rectangle 28">
+            <a:extLst>
+              <a:ext uri="{FF2B5EF4-FFF2-40B4-BE49-F238E27FC236}">
+                <a16:creationId xmlns:a16="http://schemas.microsoft.com/office/drawing/2014/main" id="{AC6472F7-879C-B735-4CD4-7735A784B55F}"/>
+              </a:ext>
+            </a:extLst>
+          </p:cNvPr>
+          <p:cNvSpPr/>
+          <p:nvPr/>
+        </p:nvSpPr>
+        <p:spPr>
+          <a:xfrm>
+            <a:off x="5972674" y="5928784"/>
+            <a:ext cx="792000" cy="504000"/>
+          </a:xfrm>
+          <a:prstGeom prst="rect">
+            <a:avLst/>
+          </a:prstGeom>
+          <a:solidFill>
+            <a:srgbClr val="EEF0A2"/>
+          </a:solidFill>
+          <a:ln>
+            <a:noFill/>
+          </a:ln>
+          <a:effectLst>
+            <a:outerShdw blurRad="50800" dist="38100" dir="2700000" algn="tl" rotWithShape="0">
+              <a:prstClr val="black">
+                <a:alpha val="40000"/>
+              </a:prstClr>
+            </a:outerShdw>
+          </a:effectLst>
+        </p:spPr>
+        <p:style>
+          <a:lnRef idx="2">
+            <a:schemeClr val="accent1">
+              <a:shade val="50000"/>
+            </a:schemeClr>
+          </a:lnRef>
+          <a:fillRef idx="1">
+            <a:schemeClr val="accent1"/>
+          </a:fillRef>
+          <a:effectRef idx="0">
+            <a:schemeClr val="accent1"/>
+          </a:effectRef>
+          <a:fontRef idx="minor">
+            <a:schemeClr val="lt1"/>
+          </a:fontRef>
+        </p:style>
+        <p:txBody>
+          <a:bodyPr rtlCol="0" anchor="ctr"/>
+          <a:lstStyle/>
+          <a:p>
+            <a:pPr algn="ctr"/>
+            <a:r>
+              <a:rPr lang="en-GB" sz="1000" dirty="0">
+                <a:solidFill>
+                  <a:schemeClr val="tx1"/>
+                </a:solidFill>
+              </a:rPr>
+              <a:t>User Story</a:t>
+            </a:r>
+          </a:p>
+        </p:txBody>
+      </p:sp>
+      <p:sp>
+        <p:nvSpPr>
+          <p:cNvPr id="31" name="Rectangle 30">
+            <a:extLst>
+              <a:ext uri="{FF2B5EF4-FFF2-40B4-BE49-F238E27FC236}">
+                <a16:creationId xmlns:a16="http://schemas.microsoft.com/office/drawing/2014/main" id="{CF40E20B-C1A9-1374-63F4-11D6FD68310F}"/>
+              </a:ext>
+            </a:extLst>
+          </p:cNvPr>
+          <p:cNvSpPr/>
+          <p:nvPr/>
+        </p:nvSpPr>
+        <p:spPr>
+          <a:xfrm>
+            <a:off x="2106137" y="5828727"/>
+            <a:ext cx="792000" cy="504000"/>
+          </a:xfrm>
+          <a:prstGeom prst="rect">
+            <a:avLst/>
+          </a:prstGeom>
+          <a:solidFill>
+            <a:srgbClr val="F6D7C2"/>
+          </a:solidFill>
+          <a:ln>
+            <a:noFill/>
+          </a:ln>
+          <a:effectLst>
+            <a:outerShdw blurRad="50800" dist="38100" dir="2700000" algn="tl" rotWithShape="0">
+              <a:prstClr val="black">
+                <a:alpha val="40000"/>
+              </a:prstClr>
+            </a:outerShdw>
+          </a:effectLst>
+        </p:spPr>
+        <p:style>
+          <a:lnRef idx="2">
+            <a:schemeClr val="accent1">
+              <a:shade val="50000"/>
+            </a:schemeClr>
+          </a:lnRef>
+          <a:fillRef idx="1">
+            <a:schemeClr val="accent1"/>
+          </a:fillRef>
+          <a:effectRef idx="0">
+            <a:schemeClr val="accent1"/>
+          </a:effectRef>
+          <a:fontRef idx="minor">
+            <a:schemeClr val="lt1"/>
+          </a:fontRef>
+        </p:style>
+        <p:txBody>
+          <a:bodyPr rtlCol="0" anchor="ctr"/>
+          <a:lstStyle/>
+          <a:p>
+            <a:pPr algn="ctr"/>
+            <a:r>
+              <a:rPr lang="en-GB" sz="1000" dirty="0">
+                <a:solidFill>
+                  <a:schemeClr val="tx1"/>
+                </a:solidFill>
+              </a:rPr>
+              <a:t>Define transient data</a:t>
+            </a:r>
+          </a:p>
+        </p:txBody>
+      </p:sp>
+      <p:sp>
+        <p:nvSpPr>
+          <p:cNvPr id="32" name="Rectangle 31">
+            <a:extLst>
+              <a:ext uri="{FF2B5EF4-FFF2-40B4-BE49-F238E27FC236}">
+                <a16:creationId xmlns:a16="http://schemas.microsoft.com/office/drawing/2014/main" id="{8B1823D6-9F59-43E3-5C40-376629BAEB87}"/>
+              </a:ext>
+            </a:extLst>
+          </p:cNvPr>
+          <p:cNvSpPr/>
+          <p:nvPr/>
+        </p:nvSpPr>
+        <p:spPr>
+          <a:xfrm>
+            <a:off x="5706495" y="3503447"/>
+            <a:ext cx="792000" cy="504000"/>
+          </a:xfrm>
+          <a:prstGeom prst="rect">
+            <a:avLst/>
+          </a:prstGeom>
+          <a:solidFill>
+            <a:srgbClr val="F6D7C2"/>
+          </a:solidFill>
+          <a:ln>
+            <a:noFill/>
+          </a:ln>
+          <a:effectLst>
+            <a:outerShdw blurRad="50800" dist="38100" dir="2700000" algn="tl" rotWithShape="0">
+              <a:prstClr val="black">
+                <a:alpha val="40000"/>
+              </a:prstClr>
+            </a:outerShdw>
+          </a:effectLst>
+        </p:spPr>
+        <p:style>
+          <a:lnRef idx="2">
+            <a:schemeClr val="accent1">
+              <a:shade val="50000"/>
+            </a:schemeClr>
+          </a:lnRef>
+          <a:fillRef idx="1">
+            <a:schemeClr val="accent1"/>
+          </a:fillRef>
+          <a:effectRef idx="0">
+            <a:schemeClr val="accent1"/>
+          </a:effectRef>
+          <a:fontRef idx="minor">
+            <a:schemeClr val="lt1"/>
+          </a:fontRef>
+        </p:style>
+        <p:txBody>
+          <a:bodyPr rtlCol="0" anchor="ctr"/>
+          <a:lstStyle/>
+          <a:p>
+            <a:pPr algn="ctr"/>
+            <a:r>
+              <a:rPr lang="en-GB" sz="1000" dirty="0">
+                <a:solidFill>
+                  <a:schemeClr val="tx1"/>
+                </a:solidFill>
+              </a:rPr>
+              <a:t>Find Charities</a:t>
+            </a:r>
+          </a:p>
+        </p:txBody>
+      </p:sp>
+      <p:sp>
+        <p:nvSpPr>
+          <p:cNvPr id="33" name="Rectangle 32">
+            <a:extLst>
+              <a:ext uri="{FF2B5EF4-FFF2-40B4-BE49-F238E27FC236}">
+                <a16:creationId xmlns:a16="http://schemas.microsoft.com/office/drawing/2014/main" id="{307B857A-0F3D-9CF6-48F0-BCE91442E4FF}"/>
+              </a:ext>
+            </a:extLst>
+          </p:cNvPr>
+          <p:cNvSpPr/>
+          <p:nvPr/>
+        </p:nvSpPr>
+        <p:spPr>
+          <a:xfrm>
+            <a:off x="2082850" y="3566769"/>
+            <a:ext cx="792000" cy="504000"/>
+          </a:xfrm>
+          <a:prstGeom prst="rect">
+            <a:avLst/>
+          </a:prstGeom>
+          <a:solidFill>
+            <a:srgbClr val="F6D7C2"/>
+          </a:solidFill>
+          <a:ln>
+            <a:noFill/>
+          </a:ln>
+          <a:effectLst>
+            <a:outerShdw blurRad="50800" dist="38100" dir="2700000" algn="tl" rotWithShape="0">
+              <a:prstClr val="black">
+                <a:alpha val="40000"/>
+              </a:prstClr>
+            </a:outerShdw>
+          </a:effectLst>
+        </p:spPr>
+        <p:style>
+          <a:lnRef idx="2">
+            <a:schemeClr val="accent1">
+              <a:shade val="50000"/>
+            </a:schemeClr>
+          </a:lnRef>
+          <a:fillRef idx="1">
+            <a:schemeClr val="accent1"/>
+          </a:fillRef>
+          <a:effectRef idx="0">
+            <a:schemeClr val="accent1"/>
+          </a:effectRef>
+          <a:fontRef idx="minor">
+            <a:schemeClr val="lt1"/>
+          </a:fontRef>
+        </p:style>
+        <p:txBody>
+          <a:bodyPr rtlCol="0" anchor="ctr"/>
+          <a:lstStyle/>
+          <a:p>
+            <a:pPr algn="ctr"/>
+            <a:r>
+              <a:rPr lang="en-GB" sz="1000" dirty="0">
+                <a:solidFill>
+                  <a:schemeClr val="tx1"/>
+                </a:solidFill>
+              </a:rPr>
+              <a:t>Option to connect</a:t>
+            </a:r>
+          </a:p>
+        </p:txBody>
+      </p:sp>
+      <p:sp>
+        <p:nvSpPr>
+          <p:cNvPr id="34" name="Rectangle 33">
+            <a:extLst>
+              <a:ext uri="{FF2B5EF4-FFF2-40B4-BE49-F238E27FC236}">
+                <a16:creationId xmlns:a16="http://schemas.microsoft.com/office/drawing/2014/main" id="{95257173-A7E5-94AD-411A-26AA94047E99}"/>
+              </a:ext>
+            </a:extLst>
+          </p:cNvPr>
+          <p:cNvSpPr/>
+          <p:nvPr/>
+        </p:nvSpPr>
+        <p:spPr>
+          <a:xfrm>
+            <a:off x="1239638" y="2996244"/>
+            <a:ext cx="792000" cy="504000"/>
+          </a:xfrm>
+          <a:prstGeom prst="rect">
+            <a:avLst/>
+          </a:prstGeom>
+          <a:solidFill>
+            <a:srgbClr val="F6D7C2"/>
+          </a:solidFill>
+          <a:ln>
+            <a:noFill/>
+          </a:ln>
+          <a:effectLst>
+            <a:outerShdw blurRad="50800" dist="38100" dir="2700000" algn="tl" rotWithShape="0">
+              <a:prstClr val="black">
+                <a:alpha val="40000"/>
+              </a:prstClr>
+            </a:outerShdw>
+          </a:effectLst>
+        </p:spPr>
+        <p:style>
+          <a:lnRef idx="2">
+            <a:schemeClr val="accent1">
+              <a:shade val="50000"/>
+            </a:schemeClr>
+          </a:lnRef>
+          <a:fillRef idx="1">
+            <a:schemeClr val="accent1"/>
+          </a:fillRef>
+          <a:effectRef idx="0">
+            <a:schemeClr val="accent1"/>
+          </a:effectRef>
+          <a:fontRef idx="minor">
+            <a:schemeClr val="lt1"/>
+          </a:fontRef>
+        </p:style>
+        <p:txBody>
+          <a:bodyPr rot="0" spcFirstLastPara="0" vertOverflow="overflow" horzOverflow="overflow" vert="horz" wrap="square" lIns="91440" tIns="45720" rIns="91440" bIns="45720" numCol="1" spcCol="0" rtlCol="0" fromWordArt="0" anchor="ctr" anchorCtr="0" forceAA="0" compatLnSpc="1">
+            <a:prstTxWarp prst="textNoShape">
+              <a:avLst/>
+            </a:prstTxWarp>
+            <a:noAutofit/>
+          </a:bodyPr>
+          <a:lstStyle/>
+          <a:p>
+            <a:pPr algn="ctr"/>
+            <a:r>
+              <a:rPr lang="en-GB" sz="1000" dirty="0">
+                <a:solidFill>
+                  <a:schemeClr val="tx1"/>
+                </a:solidFill>
+              </a:rPr>
+              <a:t>Location Tracking</a:t>
+            </a:r>
+          </a:p>
+        </p:txBody>
+      </p:sp>
+      <p:sp>
+        <p:nvSpPr>
+          <p:cNvPr id="35" name="Rectangle 34">
+            <a:extLst>
+              <a:ext uri="{FF2B5EF4-FFF2-40B4-BE49-F238E27FC236}">
+                <a16:creationId xmlns:a16="http://schemas.microsoft.com/office/drawing/2014/main" id="{2A39F992-6A31-0F7F-9A11-EEAA9E1BA73A}"/>
+              </a:ext>
+            </a:extLst>
+          </p:cNvPr>
+          <p:cNvSpPr/>
+          <p:nvPr/>
+        </p:nvSpPr>
+        <p:spPr>
+          <a:xfrm>
+            <a:off x="2097455" y="2973784"/>
+            <a:ext cx="792000" cy="504000"/>
+          </a:xfrm>
+          <a:prstGeom prst="rect">
+            <a:avLst/>
+          </a:prstGeom>
+          <a:solidFill>
+            <a:srgbClr val="B8F0A2"/>
+          </a:solidFill>
+          <a:ln>
+            <a:noFill/>
+          </a:ln>
+          <a:effectLst>
+            <a:outerShdw blurRad="50800" dist="38100" dir="2700000" algn="tl" rotWithShape="0">
+              <a:prstClr val="black">
+                <a:alpha val="40000"/>
+              </a:prstClr>
+            </a:outerShdw>
+          </a:effectLst>
+        </p:spPr>
+        <p:style>
+          <a:lnRef idx="2">
+            <a:schemeClr val="accent1">
+              <a:shade val="50000"/>
+            </a:schemeClr>
+          </a:lnRef>
+          <a:fillRef idx="1">
+            <a:schemeClr val="accent1"/>
+          </a:fillRef>
+          <a:effectRef idx="0">
+            <a:schemeClr val="accent1"/>
+          </a:effectRef>
+          <a:fontRef idx="minor">
+            <a:schemeClr val="lt1"/>
+          </a:fontRef>
+        </p:style>
+        <p:txBody>
+          <a:bodyPr rtlCol="0" anchor="ctr"/>
+          <a:lstStyle/>
+          <a:p>
+            <a:pPr algn="ctr"/>
+            <a:r>
+              <a:rPr lang="en-GB" sz="1000" dirty="0">
+                <a:solidFill>
+                  <a:schemeClr val="tx1"/>
+                </a:solidFill>
+              </a:rPr>
+              <a:t>Proximity Alert</a:t>
+            </a:r>
+          </a:p>
+        </p:txBody>
+      </p:sp>
+      <p:sp>
+        <p:nvSpPr>
+          <p:cNvPr id="36" name="Rectangle 35">
+            <a:extLst>
+              <a:ext uri="{FF2B5EF4-FFF2-40B4-BE49-F238E27FC236}">
+                <a16:creationId xmlns:a16="http://schemas.microsoft.com/office/drawing/2014/main" id="{61F1AC45-0DE4-5980-5DF4-900A903EED16}"/>
+              </a:ext>
+            </a:extLst>
+          </p:cNvPr>
+          <p:cNvSpPr/>
+          <p:nvPr/>
+        </p:nvSpPr>
+        <p:spPr>
+          <a:xfrm>
+            <a:off x="1163635" y="5805026"/>
+            <a:ext cx="792000" cy="504000"/>
+          </a:xfrm>
+          <a:prstGeom prst="rect">
+            <a:avLst/>
+          </a:prstGeom>
+          <a:solidFill>
+            <a:srgbClr val="EEF0A2"/>
+          </a:solidFill>
+          <a:ln>
+            <a:noFill/>
+          </a:ln>
+          <a:effectLst>
+            <a:outerShdw blurRad="50800" dist="38100" dir="2700000" algn="tl" rotWithShape="0">
+              <a:prstClr val="black">
+                <a:alpha val="40000"/>
+              </a:prstClr>
+            </a:outerShdw>
+          </a:effectLst>
+        </p:spPr>
+        <p:style>
+          <a:lnRef idx="2">
+            <a:schemeClr val="accent1">
+              <a:shade val="50000"/>
+            </a:schemeClr>
+          </a:lnRef>
+          <a:fillRef idx="1">
+            <a:schemeClr val="accent1"/>
+          </a:fillRef>
+          <a:effectRef idx="0">
+            <a:schemeClr val="accent1"/>
+          </a:effectRef>
+          <a:fontRef idx="minor">
+            <a:schemeClr val="lt1"/>
+          </a:fontRef>
+        </p:style>
+        <p:txBody>
+          <a:bodyPr rtlCol="0" anchor="ctr"/>
+          <a:lstStyle/>
+          <a:p>
+            <a:pPr algn="ctr"/>
+            <a:r>
+              <a:rPr lang="en-GB" sz="1000" dirty="0">
+                <a:solidFill>
+                  <a:schemeClr val="tx1"/>
+                </a:solidFill>
+              </a:rPr>
+              <a:t>Data Protection</a:t>
+            </a:r>
+          </a:p>
+        </p:txBody>
+      </p:sp>
+      <p:sp>
+        <p:nvSpPr>
+          <p:cNvPr id="38" name="Rectangle 37">
+            <a:extLst>
+              <a:ext uri="{FF2B5EF4-FFF2-40B4-BE49-F238E27FC236}">
+                <a16:creationId xmlns:a16="http://schemas.microsoft.com/office/drawing/2014/main" id="{47806A0E-CC11-133E-2889-36DB980214D5}"/>
+              </a:ext>
+            </a:extLst>
+          </p:cNvPr>
+          <p:cNvSpPr/>
+          <p:nvPr/>
+        </p:nvSpPr>
+        <p:spPr>
+          <a:xfrm>
+            <a:off x="5711670" y="1582110"/>
+            <a:ext cx="792000" cy="504000"/>
+          </a:xfrm>
+          <a:prstGeom prst="rect">
+            <a:avLst/>
+          </a:prstGeom>
+          <a:solidFill>
+            <a:srgbClr val="A2D4F0"/>
+          </a:solidFill>
+          <a:ln>
+            <a:noFill/>
+          </a:ln>
+          <a:effectLst>
+            <a:outerShdw blurRad="50800" dist="38100" dir="2700000" algn="tl" rotWithShape="0">
+              <a:prstClr val="black">
+                <a:alpha val="40000"/>
+              </a:prstClr>
+            </a:outerShdw>
+          </a:effectLst>
+        </p:spPr>
+        <p:style>
+          <a:lnRef idx="2">
+            <a:schemeClr val="accent1">
+              <a:shade val="50000"/>
+            </a:schemeClr>
+          </a:lnRef>
+          <a:fillRef idx="1">
+            <a:schemeClr val="accent1"/>
+          </a:fillRef>
+          <a:effectRef idx="0">
+            <a:schemeClr val="accent1"/>
+          </a:effectRef>
+          <a:fontRef idx="minor">
+            <a:schemeClr val="lt1"/>
+          </a:fontRef>
+        </p:style>
+        <p:txBody>
+          <a:bodyPr rtlCol="0" anchor="ctr"/>
+          <a:lstStyle/>
+          <a:p>
+            <a:pPr algn="ctr"/>
+            <a:r>
+              <a:rPr lang="en-GB" sz="1000" dirty="0">
+                <a:solidFill>
+                  <a:schemeClr val="tx1"/>
+                </a:solidFill>
+              </a:rPr>
+              <a:t>Redeem Points</a:t>
+            </a:r>
+          </a:p>
+        </p:txBody>
+      </p:sp>
+      <p:sp>
+        <p:nvSpPr>
+          <p:cNvPr id="39" name="Rectangle 38">
+            <a:extLst>
+              <a:ext uri="{FF2B5EF4-FFF2-40B4-BE49-F238E27FC236}">
+                <a16:creationId xmlns:a16="http://schemas.microsoft.com/office/drawing/2014/main" id="{7C122A40-7BFC-450B-943C-15DE7A2F4C22}"/>
+              </a:ext>
+            </a:extLst>
+          </p:cNvPr>
+          <p:cNvSpPr/>
+          <p:nvPr/>
+        </p:nvSpPr>
+        <p:spPr>
+          <a:xfrm>
+            <a:off x="6711331" y="2898026"/>
+            <a:ext cx="792000" cy="504000"/>
+          </a:xfrm>
+          <a:prstGeom prst="rect">
+            <a:avLst/>
+          </a:prstGeom>
+          <a:solidFill>
+            <a:srgbClr val="B8F0A2"/>
+          </a:solidFill>
+          <a:ln>
+            <a:noFill/>
+          </a:ln>
+          <a:effectLst>
+            <a:outerShdw blurRad="50800" dist="38100" dir="2700000" algn="tl" rotWithShape="0">
+              <a:prstClr val="black">
+                <a:alpha val="40000"/>
+              </a:prstClr>
+            </a:outerShdw>
+          </a:effectLst>
+        </p:spPr>
+        <p:style>
+          <a:lnRef idx="2">
+            <a:schemeClr val="accent1">
+              <a:shade val="50000"/>
+            </a:schemeClr>
+          </a:lnRef>
+          <a:fillRef idx="1">
+            <a:schemeClr val="accent1"/>
+          </a:fillRef>
+          <a:effectRef idx="0">
+            <a:schemeClr val="accent1"/>
+          </a:effectRef>
+          <a:fontRef idx="minor">
+            <a:schemeClr val="lt1"/>
+          </a:fontRef>
+        </p:style>
+        <p:txBody>
+          <a:bodyPr rtlCol="0" anchor="ctr"/>
+          <a:lstStyle/>
+          <a:p>
+            <a:pPr algn="ctr"/>
+            <a:r>
+              <a:rPr lang="en-GB" sz="1000" dirty="0">
+                <a:solidFill>
+                  <a:schemeClr val="tx1"/>
+                </a:solidFill>
+              </a:rPr>
+              <a:t>API to analytics</a:t>
+            </a:r>
+          </a:p>
+        </p:txBody>
+      </p:sp>
+      <p:sp>
+        <p:nvSpPr>
+          <p:cNvPr id="40" name="Rectangle 39">
+            <a:extLst>
+              <a:ext uri="{FF2B5EF4-FFF2-40B4-BE49-F238E27FC236}">
+                <a16:creationId xmlns:a16="http://schemas.microsoft.com/office/drawing/2014/main" id="{D6C87AA1-0838-581A-61BA-41E0B2175692}"/>
+              </a:ext>
+            </a:extLst>
+          </p:cNvPr>
+          <p:cNvSpPr/>
+          <p:nvPr/>
+        </p:nvSpPr>
+        <p:spPr>
+          <a:xfrm>
+            <a:off x="6727032" y="2267209"/>
+            <a:ext cx="792000" cy="504000"/>
+          </a:xfrm>
+          <a:prstGeom prst="rect">
+            <a:avLst/>
+          </a:prstGeom>
+          <a:solidFill>
+            <a:srgbClr val="EEF0A2"/>
+          </a:solidFill>
+          <a:ln>
+            <a:noFill/>
+          </a:ln>
+          <a:effectLst>
+            <a:outerShdw blurRad="50800" dist="38100" dir="2700000" algn="tl" rotWithShape="0">
+              <a:prstClr val="black">
+                <a:alpha val="40000"/>
+              </a:prstClr>
+            </a:outerShdw>
+          </a:effectLst>
+        </p:spPr>
+        <p:style>
+          <a:lnRef idx="2">
+            <a:schemeClr val="accent1">
+              <a:shade val="50000"/>
+            </a:schemeClr>
+          </a:lnRef>
+          <a:fillRef idx="1">
+            <a:schemeClr val="accent1"/>
+          </a:fillRef>
+          <a:effectRef idx="0">
+            <a:schemeClr val="accent1"/>
+          </a:effectRef>
+          <a:fontRef idx="minor">
+            <a:schemeClr val="lt1"/>
+          </a:fontRef>
+        </p:style>
+        <p:txBody>
+          <a:bodyPr rtlCol="0" anchor="ctr"/>
+          <a:lstStyle/>
+          <a:p>
+            <a:pPr algn="ctr"/>
+            <a:r>
+              <a:rPr lang="en-GB" sz="1000" dirty="0">
+                <a:solidFill>
+                  <a:schemeClr val="tx1"/>
+                </a:solidFill>
+              </a:rPr>
+              <a:t>Capture</a:t>
+            </a:r>
+          </a:p>
+        </p:txBody>
+      </p:sp>
+      <p:sp>
+        <p:nvSpPr>
+          <p:cNvPr id="41" name="Rectangle 40">
+            <a:extLst>
+              <a:ext uri="{FF2B5EF4-FFF2-40B4-BE49-F238E27FC236}">
+                <a16:creationId xmlns:a16="http://schemas.microsoft.com/office/drawing/2014/main" id="{17016B92-37FC-A6D2-0E21-9DD531EC2C5D}"/>
+              </a:ext>
+            </a:extLst>
+          </p:cNvPr>
+          <p:cNvSpPr/>
+          <p:nvPr/>
+        </p:nvSpPr>
+        <p:spPr>
+          <a:xfrm>
+            <a:off x="2065305" y="4159754"/>
+            <a:ext cx="792000" cy="504000"/>
+          </a:xfrm>
+          <a:prstGeom prst="rect">
+            <a:avLst/>
+          </a:prstGeom>
+          <a:solidFill>
+            <a:srgbClr val="B8F0A2"/>
+          </a:solidFill>
+          <a:ln>
+            <a:noFill/>
+          </a:ln>
+          <a:effectLst>
+            <a:outerShdw blurRad="50800" dist="38100" dir="2700000" algn="tl" rotWithShape="0">
+              <a:prstClr val="black">
+                <a:alpha val="40000"/>
+              </a:prstClr>
+            </a:outerShdw>
+          </a:effectLst>
+        </p:spPr>
+        <p:style>
+          <a:lnRef idx="2">
+            <a:schemeClr val="accent1">
+              <a:shade val="50000"/>
+            </a:schemeClr>
+          </a:lnRef>
+          <a:fillRef idx="1">
+            <a:schemeClr val="accent1"/>
+          </a:fillRef>
+          <a:effectRef idx="0">
+            <a:schemeClr val="accent1"/>
+          </a:effectRef>
+          <a:fontRef idx="minor">
+            <a:schemeClr val="lt1"/>
+          </a:fontRef>
+        </p:style>
+        <p:txBody>
+          <a:bodyPr rtlCol="0" anchor="ctr"/>
+          <a:lstStyle/>
+          <a:p>
+            <a:pPr algn="ctr"/>
+            <a:r>
+              <a:rPr lang="en-GB" sz="1000" dirty="0">
+                <a:solidFill>
+                  <a:schemeClr val="tx1"/>
+                </a:solidFill>
+              </a:rPr>
+              <a:t>Get Map</a:t>
+            </a:r>
+          </a:p>
+        </p:txBody>
+      </p:sp>
+      <p:sp>
+        <p:nvSpPr>
+          <p:cNvPr id="42" name="Rectangle 41">
+            <a:extLst>
+              <a:ext uri="{FF2B5EF4-FFF2-40B4-BE49-F238E27FC236}">
+                <a16:creationId xmlns:a16="http://schemas.microsoft.com/office/drawing/2014/main" id="{3BE27F63-A3F3-80FC-2040-5AF306929213}"/>
+              </a:ext>
+            </a:extLst>
+          </p:cNvPr>
+          <p:cNvSpPr/>
+          <p:nvPr/>
+        </p:nvSpPr>
+        <p:spPr>
+          <a:xfrm>
+            <a:off x="4783001" y="2925000"/>
+            <a:ext cx="792000" cy="504000"/>
+          </a:xfrm>
+          <a:prstGeom prst="rect">
+            <a:avLst/>
+          </a:prstGeom>
+          <a:solidFill>
+            <a:srgbClr val="B8F0A2"/>
+          </a:solidFill>
+          <a:ln>
+            <a:noFill/>
+          </a:ln>
+          <a:effectLst>
+            <a:outerShdw blurRad="50800" dist="38100" dir="2700000" algn="tl" rotWithShape="0">
+              <a:prstClr val="black">
+                <a:alpha val="40000"/>
+              </a:prstClr>
+            </a:outerShdw>
+          </a:effectLst>
+        </p:spPr>
+        <p:style>
+          <a:lnRef idx="2">
+            <a:schemeClr val="accent1">
+              <a:shade val="50000"/>
+            </a:schemeClr>
+          </a:lnRef>
+          <a:fillRef idx="1">
+            <a:schemeClr val="accent1"/>
+          </a:fillRef>
+          <a:effectRef idx="0">
+            <a:schemeClr val="accent1"/>
+          </a:effectRef>
+          <a:fontRef idx="minor">
+            <a:schemeClr val="lt1"/>
+          </a:fontRef>
+        </p:style>
+        <p:txBody>
+          <a:bodyPr rtlCol="0" anchor="ctr"/>
+          <a:lstStyle/>
+          <a:p>
+            <a:pPr algn="ctr"/>
+            <a:r>
+              <a:rPr lang="en-GB" sz="1000" dirty="0">
+                <a:solidFill>
+                  <a:schemeClr val="tx1"/>
+                </a:solidFill>
+              </a:rPr>
+              <a:t>Charities Connect</a:t>
+            </a:r>
+          </a:p>
+        </p:txBody>
+      </p:sp>
+      <p:sp>
+        <p:nvSpPr>
+          <p:cNvPr id="43" name="Rectangle 42">
+            <a:extLst>
+              <a:ext uri="{FF2B5EF4-FFF2-40B4-BE49-F238E27FC236}">
+                <a16:creationId xmlns:a16="http://schemas.microsoft.com/office/drawing/2014/main" id="{0A52FE97-27AF-8694-3C74-C41D81D6FAA6}"/>
+              </a:ext>
+            </a:extLst>
+          </p:cNvPr>
+          <p:cNvSpPr/>
+          <p:nvPr/>
+        </p:nvSpPr>
+        <p:spPr>
+          <a:xfrm>
+            <a:off x="4804235" y="3546402"/>
+            <a:ext cx="792000" cy="504000"/>
+          </a:xfrm>
+          <a:prstGeom prst="rect">
+            <a:avLst/>
+          </a:prstGeom>
+          <a:solidFill>
+            <a:srgbClr val="B8F0A2"/>
+          </a:solidFill>
+          <a:ln>
+            <a:noFill/>
+          </a:ln>
+          <a:effectLst>
+            <a:outerShdw blurRad="50800" dist="38100" dir="2700000" algn="tl" rotWithShape="0">
+              <a:prstClr val="black">
+                <a:alpha val="40000"/>
+              </a:prstClr>
+            </a:outerShdw>
+          </a:effectLst>
+        </p:spPr>
+        <p:style>
+          <a:lnRef idx="2">
+            <a:schemeClr val="accent1">
+              <a:shade val="50000"/>
+            </a:schemeClr>
+          </a:lnRef>
+          <a:fillRef idx="1">
+            <a:schemeClr val="accent1"/>
+          </a:fillRef>
+          <a:effectRef idx="0">
+            <a:schemeClr val="accent1"/>
+          </a:effectRef>
+          <a:fontRef idx="minor">
+            <a:schemeClr val="lt1"/>
+          </a:fontRef>
+        </p:style>
+        <p:txBody>
+          <a:bodyPr rtlCol="0" anchor="ctr"/>
+          <a:lstStyle/>
+          <a:p>
+            <a:pPr algn="ctr"/>
+            <a:r>
+              <a:rPr lang="en-GB" sz="1000" dirty="0">
+                <a:solidFill>
+                  <a:schemeClr val="tx1"/>
+                </a:solidFill>
+              </a:rPr>
+              <a:t>Browse Charities</a:t>
+            </a:r>
+          </a:p>
+        </p:txBody>
+      </p:sp>
+      <p:sp>
+        <p:nvSpPr>
+          <p:cNvPr id="44" name="Rectangle 43">
+            <a:extLst>
+              <a:ext uri="{FF2B5EF4-FFF2-40B4-BE49-F238E27FC236}">
+                <a16:creationId xmlns:a16="http://schemas.microsoft.com/office/drawing/2014/main" id="{63EE49DC-D2E5-41A1-D57A-BFC21AD24886}"/>
+              </a:ext>
+            </a:extLst>
+          </p:cNvPr>
+          <p:cNvSpPr/>
+          <p:nvPr/>
+        </p:nvSpPr>
+        <p:spPr>
+          <a:xfrm>
+            <a:off x="4838190" y="4146632"/>
+            <a:ext cx="792000" cy="504000"/>
+          </a:xfrm>
+          <a:prstGeom prst="rect">
+            <a:avLst/>
+          </a:prstGeom>
+          <a:solidFill>
+            <a:srgbClr val="B8F0A2"/>
+          </a:solidFill>
+          <a:ln>
+            <a:noFill/>
+          </a:ln>
+          <a:effectLst>
+            <a:outerShdw blurRad="50800" dist="38100" dir="2700000" algn="tl" rotWithShape="0">
+              <a:prstClr val="black">
+                <a:alpha val="40000"/>
+              </a:prstClr>
+            </a:outerShdw>
+          </a:effectLst>
+        </p:spPr>
+        <p:style>
+          <a:lnRef idx="2">
+            <a:schemeClr val="accent1">
+              <a:shade val="50000"/>
+            </a:schemeClr>
+          </a:lnRef>
+          <a:fillRef idx="1">
+            <a:schemeClr val="accent1"/>
+          </a:fillRef>
+          <a:effectRef idx="0">
+            <a:schemeClr val="accent1"/>
+          </a:effectRef>
+          <a:fontRef idx="minor">
+            <a:schemeClr val="lt1"/>
+          </a:fontRef>
+        </p:style>
+        <p:txBody>
+          <a:bodyPr rtlCol="0" anchor="ctr"/>
+          <a:lstStyle/>
+          <a:p>
+            <a:pPr algn="ctr"/>
+            <a:r>
+              <a:rPr lang="en-GB" sz="1000" dirty="0">
+                <a:solidFill>
+                  <a:schemeClr val="tx1"/>
+                </a:solidFill>
+              </a:rPr>
+              <a:t>Businesses Connect</a:t>
+            </a:r>
+          </a:p>
+        </p:txBody>
+      </p:sp>
+      <p:sp>
+        <p:nvSpPr>
+          <p:cNvPr id="45" name="Rectangle 44">
+            <a:extLst>
+              <a:ext uri="{FF2B5EF4-FFF2-40B4-BE49-F238E27FC236}">
+                <a16:creationId xmlns:a16="http://schemas.microsoft.com/office/drawing/2014/main" id="{A0A6E9E7-B4AF-CC0C-4252-E7BD66F7219D}"/>
+              </a:ext>
+            </a:extLst>
+          </p:cNvPr>
+          <p:cNvSpPr/>
+          <p:nvPr/>
+        </p:nvSpPr>
+        <p:spPr>
+          <a:xfrm>
+            <a:off x="4859424" y="4768034"/>
+            <a:ext cx="792000" cy="504000"/>
+          </a:xfrm>
+          <a:prstGeom prst="rect">
+            <a:avLst/>
+          </a:prstGeom>
+          <a:solidFill>
+            <a:srgbClr val="B8F0A2"/>
+          </a:solidFill>
+          <a:ln>
+            <a:noFill/>
+          </a:ln>
+          <a:effectLst>
+            <a:outerShdw blurRad="50800" dist="38100" dir="2700000" algn="tl" rotWithShape="0">
+              <a:prstClr val="black">
+                <a:alpha val="40000"/>
+              </a:prstClr>
+            </a:outerShdw>
+          </a:effectLst>
+        </p:spPr>
+        <p:style>
+          <a:lnRef idx="2">
+            <a:schemeClr val="accent1">
+              <a:shade val="50000"/>
+            </a:schemeClr>
+          </a:lnRef>
+          <a:fillRef idx="1">
+            <a:schemeClr val="accent1"/>
+          </a:fillRef>
+          <a:effectRef idx="0">
+            <a:schemeClr val="accent1"/>
+          </a:effectRef>
+          <a:fontRef idx="minor">
+            <a:schemeClr val="lt1"/>
+          </a:fontRef>
+        </p:style>
+        <p:txBody>
+          <a:bodyPr rtlCol="0" anchor="ctr"/>
+          <a:lstStyle/>
+          <a:p>
+            <a:pPr algn="ctr"/>
+            <a:r>
+              <a:rPr lang="en-GB" sz="1000" dirty="0">
+                <a:solidFill>
+                  <a:schemeClr val="tx1"/>
+                </a:solidFill>
+              </a:rPr>
+              <a:t>Browse Businesses</a:t>
+            </a:r>
+          </a:p>
+        </p:txBody>
+      </p:sp>
+      <p:sp>
+        <p:nvSpPr>
+          <p:cNvPr id="46" name="Rectangle 45">
+            <a:extLst>
+              <a:ext uri="{FF2B5EF4-FFF2-40B4-BE49-F238E27FC236}">
+                <a16:creationId xmlns:a16="http://schemas.microsoft.com/office/drawing/2014/main" id="{D1FBBE0C-F8F6-A716-2036-CDF607454EE1}"/>
+              </a:ext>
+            </a:extLst>
+          </p:cNvPr>
+          <p:cNvSpPr/>
+          <p:nvPr/>
+        </p:nvSpPr>
+        <p:spPr>
+          <a:xfrm>
+            <a:off x="6642439" y="3494585"/>
+            <a:ext cx="792000" cy="504000"/>
+          </a:xfrm>
+          <a:prstGeom prst="rect">
+            <a:avLst/>
+          </a:prstGeom>
+          <a:solidFill>
+            <a:srgbClr val="F6D7C2"/>
+          </a:solidFill>
+          <a:ln>
+            <a:noFill/>
+          </a:ln>
+          <a:effectLst>
+            <a:outerShdw blurRad="50800" dist="38100" dir="2700000" algn="tl" rotWithShape="0">
+              <a:prstClr val="black">
+                <a:alpha val="40000"/>
+              </a:prstClr>
+            </a:outerShdw>
+          </a:effectLst>
+        </p:spPr>
+        <p:style>
+          <a:lnRef idx="2">
+            <a:schemeClr val="accent1">
+              <a:shade val="50000"/>
+            </a:schemeClr>
+          </a:lnRef>
+          <a:fillRef idx="1">
+            <a:schemeClr val="accent1"/>
+          </a:fillRef>
+          <a:effectRef idx="0">
+            <a:schemeClr val="accent1"/>
+          </a:effectRef>
+          <a:fontRef idx="minor">
+            <a:schemeClr val="lt1"/>
+          </a:fontRef>
+        </p:style>
+        <p:txBody>
+          <a:bodyPr rtlCol="0" anchor="ctr"/>
+          <a:lstStyle/>
+          <a:p>
+            <a:pPr algn="ctr"/>
+            <a:r>
+              <a:rPr lang="en-GB" sz="900" dirty="0">
+                <a:solidFill>
+                  <a:schemeClr val="tx1"/>
+                </a:solidFill>
+              </a:rPr>
+              <a:t>Track engagement</a:t>
+            </a:r>
+          </a:p>
+        </p:txBody>
+      </p:sp>
+    </p:spTree>
+    <p:extLst>
+      <p:ext uri="{BB962C8B-B14F-4D97-AF65-F5344CB8AC3E}">
+        <p14:creationId xmlns:p14="http://schemas.microsoft.com/office/powerpoint/2010/main" val="2599735742"/>
+      </p:ext>
+    </p:extLst>
+  </p:cSld>
+  <p:clrMapOvr>
+    <a:masterClrMapping/>
+  </p:clrMapOvr>
+</p:sld>
+</file>
+
+<file path=ppt/slides/slide4.xml><?xml version="1.0" encoding="utf-8"?>
+<p:sld xmlns:a="http://schemas.openxmlformats.org/drawingml/2006/main" xmlns:r="http://schemas.openxmlformats.org/officeDocument/2006/relationships" xmlns:p="http://schemas.openxmlformats.org/presentationml/2006/main">
+  <p:cSld>
+    <p:spTree>
+      <p:nvGrpSpPr>
+        <p:cNvPr id="1" name=""/>
+        <p:cNvGrpSpPr/>
+        <p:nvPr/>
+      </p:nvGrpSpPr>
+      <p:grpSpPr>
+        <a:xfrm>
+          <a:off x="0" y="0"/>
+          <a:ext cx="0" cy="0"/>
+          <a:chOff x="0" y="0"/>
+          <a:chExt cx="0" cy="0"/>
+        </a:xfrm>
+      </p:grpSpPr>
+      <p:sp>
+        <p:nvSpPr>
+          <p:cNvPr id="2" name="Title 1">
+            <a:extLst>
+              <a:ext uri="{FF2B5EF4-FFF2-40B4-BE49-F238E27FC236}">
+                <a16:creationId xmlns:a16="http://schemas.microsoft.com/office/drawing/2014/main" id="{E413FDBD-F942-264B-54F3-75CD7A0CDC44}"/>
+              </a:ext>
+            </a:extLst>
+          </p:cNvPr>
+          <p:cNvSpPr>
+            <a:spLocks noGrp="1"/>
+          </p:cNvSpPr>
+          <p:nvPr>
+            <p:ph type="title"/>
+          </p:nvPr>
+        </p:nvSpPr>
+        <p:spPr/>
+        <p:txBody>
+          <a:bodyPr>
+            <a:normAutofit fontScale="90000"/>
+          </a:bodyPr>
+          <a:lstStyle/>
+          <a:p>
+            <a:r>
+              <a:rPr lang="en-GB" dirty="0"/>
+              <a:t>Notes</a:t>
+            </a:r>
+          </a:p>
+        </p:txBody>
+      </p:sp>
+      <p:sp>
+        <p:nvSpPr>
+          <p:cNvPr id="4" name="TextBox 3">
+            <a:extLst>
+              <a:ext uri="{FF2B5EF4-FFF2-40B4-BE49-F238E27FC236}">
+                <a16:creationId xmlns:a16="http://schemas.microsoft.com/office/drawing/2014/main" id="{CBA2A2CA-A744-23AB-E6ED-0F2C630772A2}"/>
+              </a:ext>
+            </a:extLst>
+          </p:cNvPr>
+          <p:cNvSpPr txBox="1"/>
+          <p:nvPr/>
+        </p:nvSpPr>
+        <p:spPr>
+          <a:xfrm>
+            <a:off x="4594860" y="1529834"/>
+            <a:ext cx="4562475" cy="3416320"/>
+          </a:xfrm>
+          <a:prstGeom prst="rect">
+            <a:avLst/>
+          </a:prstGeom>
+          <a:noFill/>
+        </p:spPr>
+        <p:txBody>
+          <a:bodyPr wrap="square">
+            <a:spAutoFit/>
+          </a:bodyPr>
+          <a:lstStyle/>
+          <a:p>
+            <a:r>
+              <a:rPr lang="en-GB" sz="1800" b="1" dirty="0"/>
+              <a:t>Don’t force everything into a story</a:t>
+            </a:r>
+          </a:p>
+          <a:p>
+            <a:endParaRPr lang="en-GB" dirty="0"/>
+          </a:p>
+          <a:p>
+            <a:r>
+              <a:rPr lang="en-GB" dirty="0"/>
+              <a:t>Client facing requirements can use story structure</a:t>
+            </a:r>
+          </a:p>
+          <a:p>
+            <a:r>
+              <a:rPr lang="en-GB" b="1" dirty="0">
+                <a:solidFill>
+                  <a:srgbClr val="00B050"/>
+                </a:solidFill>
+                <a:sym typeface="Wingdings 2" panose="05020102010507070707" pitchFamily="18" charset="2"/>
+              </a:rPr>
+              <a:t> </a:t>
+            </a:r>
+            <a:r>
+              <a:rPr lang="en-GB" dirty="0"/>
+              <a:t>As a user I need to check my points balance so that I can redeem rewards</a:t>
+            </a:r>
+          </a:p>
+          <a:p>
+            <a:endParaRPr lang="en-GB" dirty="0"/>
+          </a:p>
+          <a:p>
+            <a:r>
+              <a:rPr lang="en-GB" dirty="0"/>
+              <a:t>Non functional requirements may just be requirements!</a:t>
+            </a:r>
+          </a:p>
+          <a:p>
+            <a:r>
+              <a:rPr lang="en-GB" b="1" dirty="0">
+                <a:solidFill>
+                  <a:srgbClr val="C00000"/>
+                </a:solidFill>
+                <a:sym typeface="Wingdings 2" panose="05020102010507070707" pitchFamily="18" charset="2"/>
+              </a:rPr>
+              <a:t> </a:t>
+            </a:r>
+            <a:r>
+              <a:rPr lang="en-GB" dirty="0"/>
+              <a:t>As a customer I need a performant system so as not to get really frustrated</a:t>
+            </a:r>
+          </a:p>
+          <a:p>
+            <a:r>
+              <a:rPr lang="en-GB" b="1" dirty="0">
+                <a:solidFill>
+                  <a:srgbClr val="00B050"/>
+                </a:solidFill>
+                <a:sym typeface="Wingdings 2" panose="05020102010507070707" pitchFamily="18" charset="2"/>
+              </a:rPr>
+              <a:t> </a:t>
+            </a:r>
+            <a:r>
+              <a:rPr lang="en-GB" dirty="0"/>
+              <a:t>The system shall respond within 5ms</a:t>
+            </a:r>
+          </a:p>
+        </p:txBody>
+      </p:sp>
+      <p:sp>
+        <p:nvSpPr>
+          <p:cNvPr id="5" name="TextBox 4">
+            <a:extLst>
+              <a:ext uri="{FF2B5EF4-FFF2-40B4-BE49-F238E27FC236}">
+                <a16:creationId xmlns:a16="http://schemas.microsoft.com/office/drawing/2014/main" id="{1985F874-2672-CA1D-6EF7-2660FF2B9767}"/>
+              </a:ext>
+            </a:extLst>
+          </p:cNvPr>
+          <p:cNvSpPr txBox="1"/>
+          <p:nvPr/>
+        </p:nvSpPr>
+        <p:spPr>
+          <a:xfrm>
+            <a:off x="213360" y="4758809"/>
+            <a:ext cx="4562475" cy="1200329"/>
+          </a:xfrm>
+          <a:prstGeom prst="rect">
+            <a:avLst/>
+          </a:prstGeom>
+          <a:noFill/>
+        </p:spPr>
+        <p:txBody>
+          <a:bodyPr wrap="square">
+            <a:spAutoFit/>
+          </a:bodyPr>
+          <a:lstStyle/>
+          <a:p>
+            <a:r>
+              <a:rPr lang="en-GB" sz="1800" b="1" dirty="0"/>
+              <a:t>Use the right diagram for the right job</a:t>
+            </a:r>
+          </a:p>
+          <a:p>
+            <a:endParaRPr lang="en-GB" dirty="0"/>
+          </a:p>
+          <a:p>
+            <a:r>
+              <a:rPr lang="en-GB" b="1" dirty="0">
+                <a:solidFill>
+                  <a:srgbClr val="00B050"/>
+                </a:solidFill>
+                <a:sym typeface="Wingdings 2" panose="05020102010507070707" pitchFamily="18" charset="2"/>
+              </a:rPr>
+              <a:t> </a:t>
+            </a:r>
+            <a:r>
+              <a:rPr lang="en-GB" dirty="0"/>
+              <a:t>C4 is good at the system level</a:t>
+            </a:r>
+          </a:p>
+          <a:p>
+            <a:r>
+              <a:rPr lang="en-GB" b="1" dirty="0">
+                <a:solidFill>
+                  <a:srgbClr val="00B050"/>
+                </a:solidFill>
+                <a:sym typeface="Wingdings 2" panose="05020102010507070707" pitchFamily="18" charset="2"/>
+              </a:rPr>
+              <a:t> </a:t>
+            </a:r>
+            <a:r>
+              <a:rPr lang="en-GB" dirty="0"/>
+              <a:t>UML, </a:t>
+            </a:r>
+            <a:r>
+              <a:rPr lang="en-GB" dirty="0" err="1"/>
+              <a:t>SysML</a:t>
+            </a:r>
+            <a:r>
+              <a:rPr lang="en-GB" dirty="0"/>
+              <a:t>, BPMN is good for details</a:t>
+            </a:r>
+          </a:p>
+        </p:txBody>
+      </p:sp>
+    </p:spTree>
+    <p:extLst>
+      <p:ext uri="{BB962C8B-B14F-4D97-AF65-F5344CB8AC3E}">
+        <p14:creationId xmlns:p14="http://schemas.microsoft.com/office/powerpoint/2010/main" val="2825137827"/>
       </p:ext>
     </p:extLst>
   </p:cSld>

</xml_diff>